<commit_message>
mise a jour du recyclerview et du Swiperefresh
</commit_message>
<xml_diff>
--- a/P05_Audric_Larose/P6_Larose_Audric/P6_Diagrammmes/P6_Pizza Restaurant.pptx
+++ b/P05_Audric_Larose/P6_Larose_Audric/P6_Diagrammmes/P6_Pizza Restaurant.pptx
@@ -11,10 +11,10 @@
     <p:sldId id="257" r:id="rId5"/>
     <p:sldId id="258" r:id="rId6"/>
     <p:sldId id="342" r:id="rId7"/>
-    <p:sldId id="341" r:id="rId8"/>
-    <p:sldId id="343" r:id="rId9"/>
-    <p:sldId id="344" r:id="rId10"/>
-    <p:sldId id="345" r:id="rId11"/>
+    <p:sldId id="345" r:id="rId8"/>
+    <p:sldId id="341" r:id="rId9"/>
+    <p:sldId id="343" r:id="rId10"/>
+    <p:sldId id="344" r:id="rId11"/>
     <p:sldId id="301" r:id="rId12"/>
   </p:sldIdLst>
   <p:sldSz cx="12192000" cy="6858000"/>
@@ -13396,6 +13396,1316 @@
         </p:nvGrpSpPr>
         <p:grpSpPr>
           <a:xfrm>
+            <a:off x="1431122" y="1606110"/>
+            <a:ext cx="4734219" cy="4623159"/>
+            <a:chOff x="924229" y="1606109"/>
+            <a:chExt cx="4734219" cy="4623159"/>
+          </a:xfrm>
+        </p:grpSpPr>
+        <p:sp>
+          <p:nvSpPr>
+            <p:cNvPr id="3" name="Block Arc 2">
+              <a:extLst>
+                <a:ext uri="{FF2B5EF4-FFF2-40B4-BE49-F238E27FC236}">
+                  <a16:creationId xmlns:a16="http://schemas.microsoft.com/office/drawing/2014/main" id="{C212287D-148A-485C-BF8A-3A1F88F04391}"/>
+                </a:ext>
+              </a:extLst>
+            </p:cNvPr>
+            <p:cNvSpPr/>
+            <p:nvPr/>
+          </p:nvSpPr>
+          <p:spPr>
+            <a:xfrm>
+              <a:off x="924229" y="1606109"/>
+              <a:ext cx="4623159" cy="4623159"/>
+            </a:xfrm>
+            <a:prstGeom prst="blockArc">
+              <a:avLst>
+                <a:gd name="adj1" fmla="val 17994494"/>
+                <a:gd name="adj2" fmla="val 3631056"/>
+                <a:gd name="adj3" fmla="val 1264"/>
+              </a:avLst>
+            </a:prstGeom>
+            <a:solidFill>
+              <a:schemeClr val="bg1">
+                <a:lumMod val="85000"/>
+              </a:schemeClr>
+            </a:solidFill>
+            <a:ln>
+              <a:noFill/>
+            </a:ln>
+          </p:spPr>
+          <p:style>
+            <a:lnRef idx="2">
+              <a:schemeClr val="accent1">
+                <a:shade val="50000"/>
+              </a:schemeClr>
+            </a:lnRef>
+            <a:fillRef idx="1">
+              <a:schemeClr val="accent1"/>
+            </a:fillRef>
+            <a:effectRef idx="0">
+              <a:schemeClr val="accent1"/>
+            </a:effectRef>
+            <a:fontRef idx="minor">
+              <a:schemeClr val="lt1"/>
+            </a:fontRef>
+          </p:style>
+          <p:txBody>
+            <a:bodyPr rtlCol="0" anchor="ctr"/>
+            <a:lstStyle/>
+            <a:p>
+              <a:pPr algn="ctr"/>
+              <a:endParaRPr lang="ko-KR" altLang="en-US" sz="2700">
+                <a:solidFill>
+                  <a:schemeClr val="tx1"/>
+                </a:solidFill>
+              </a:endParaRPr>
+            </a:p>
+          </p:txBody>
+        </p:sp>
+        <p:sp>
+          <p:nvSpPr>
+            <p:cNvPr id="4" name="Oval 3">
+              <a:extLst>
+                <a:ext uri="{FF2B5EF4-FFF2-40B4-BE49-F238E27FC236}">
+                  <a16:creationId xmlns:a16="http://schemas.microsoft.com/office/drawing/2014/main" id="{FAB23284-0952-47BD-A137-FAF9A7ECF454}"/>
+                </a:ext>
+              </a:extLst>
+            </p:cNvPr>
+            <p:cNvSpPr/>
+            <p:nvPr/>
+          </p:nvSpPr>
+          <p:spPr>
+            <a:xfrm>
+              <a:off x="4238091" y="1766259"/>
+              <a:ext cx="288032" cy="288032"/>
+            </a:xfrm>
+            <a:prstGeom prst="ellipse">
+              <a:avLst/>
+            </a:prstGeom>
+            <a:solidFill>
+              <a:schemeClr val="accent6"/>
+            </a:solidFill>
+            <a:ln>
+              <a:noFill/>
+            </a:ln>
+          </p:spPr>
+          <p:style>
+            <a:lnRef idx="2">
+              <a:schemeClr val="accent1">
+                <a:shade val="50000"/>
+              </a:schemeClr>
+            </a:lnRef>
+            <a:fillRef idx="1">
+              <a:schemeClr val="accent1"/>
+            </a:fillRef>
+            <a:effectRef idx="0">
+              <a:schemeClr val="accent1"/>
+            </a:effectRef>
+            <a:fontRef idx="minor">
+              <a:schemeClr val="lt1"/>
+            </a:fontRef>
+          </p:style>
+          <p:txBody>
+            <a:bodyPr rtlCol="0" anchor="ctr"/>
+            <a:lstStyle/>
+            <a:p>
+              <a:pPr algn="ctr"/>
+              <a:endParaRPr lang="ko-KR" altLang="en-US" sz="2700"/>
+            </a:p>
+          </p:txBody>
+        </p:sp>
+        <p:sp>
+          <p:nvSpPr>
+            <p:cNvPr id="5" name="Oval 4">
+              <a:extLst>
+                <a:ext uri="{FF2B5EF4-FFF2-40B4-BE49-F238E27FC236}">
+                  <a16:creationId xmlns:a16="http://schemas.microsoft.com/office/drawing/2014/main" id="{6020D691-FAD5-4B45-A097-6D4210076323}"/>
+                </a:ext>
+              </a:extLst>
+            </p:cNvPr>
+            <p:cNvSpPr/>
+            <p:nvPr/>
+          </p:nvSpPr>
+          <p:spPr>
+            <a:xfrm>
+              <a:off x="5370416" y="3760400"/>
+              <a:ext cx="288032" cy="288032"/>
+            </a:xfrm>
+            <a:prstGeom prst="ellipse">
+              <a:avLst/>
+            </a:prstGeom>
+            <a:solidFill>
+              <a:schemeClr val="accent2"/>
+            </a:solidFill>
+            <a:ln>
+              <a:noFill/>
+            </a:ln>
+          </p:spPr>
+          <p:style>
+            <a:lnRef idx="2">
+              <a:schemeClr val="accent1">
+                <a:shade val="50000"/>
+              </a:schemeClr>
+            </a:lnRef>
+            <a:fillRef idx="1">
+              <a:schemeClr val="accent1"/>
+            </a:fillRef>
+            <a:effectRef idx="0">
+              <a:schemeClr val="accent1"/>
+            </a:effectRef>
+            <a:fontRef idx="minor">
+              <a:schemeClr val="lt1"/>
+            </a:fontRef>
+          </p:style>
+          <p:txBody>
+            <a:bodyPr rtlCol="0" anchor="ctr"/>
+            <a:lstStyle/>
+            <a:p>
+              <a:pPr algn="ctr"/>
+              <a:endParaRPr lang="ko-KR" altLang="en-US" sz="2700"/>
+            </a:p>
+          </p:txBody>
+        </p:sp>
+        <p:sp>
+          <p:nvSpPr>
+            <p:cNvPr id="6" name="Oval 5">
+              <a:extLst>
+                <a:ext uri="{FF2B5EF4-FFF2-40B4-BE49-F238E27FC236}">
+                  <a16:creationId xmlns:a16="http://schemas.microsoft.com/office/drawing/2014/main" id="{260E0257-2299-4795-8DCE-DB07FC19AA57}"/>
+                </a:ext>
+              </a:extLst>
+            </p:cNvPr>
+            <p:cNvSpPr/>
+            <p:nvPr/>
+          </p:nvSpPr>
+          <p:spPr>
+            <a:xfrm>
+              <a:off x="4238091" y="5754540"/>
+              <a:ext cx="288032" cy="288032"/>
+            </a:xfrm>
+            <a:prstGeom prst="ellipse">
+              <a:avLst/>
+            </a:prstGeom>
+            <a:solidFill>
+              <a:schemeClr val="accent4"/>
+            </a:solidFill>
+            <a:ln>
+              <a:noFill/>
+            </a:ln>
+          </p:spPr>
+          <p:style>
+            <a:lnRef idx="2">
+              <a:schemeClr val="accent1">
+                <a:shade val="50000"/>
+              </a:schemeClr>
+            </a:lnRef>
+            <a:fillRef idx="1">
+              <a:schemeClr val="accent1"/>
+            </a:fillRef>
+            <a:effectRef idx="0">
+              <a:schemeClr val="accent1"/>
+            </a:effectRef>
+            <a:fontRef idx="minor">
+              <a:schemeClr val="lt1"/>
+            </a:fontRef>
+          </p:style>
+          <p:txBody>
+            <a:bodyPr rtlCol="0" anchor="ctr"/>
+            <a:lstStyle/>
+            <a:p>
+              <a:pPr algn="ctr"/>
+              <a:endParaRPr lang="ko-KR" altLang="en-US" sz="2700"/>
+            </a:p>
+          </p:txBody>
+        </p:sp>
+        <p:sp>
+          <p:nvSpPr>
+            <p:cNvPr id="7" name="Oval 6">
+              <a:extLst>
+                <a:ext uri="{FF2B5EF4-FFF2-40B4-BE49-F238E27FC236}">
+                  <a16:creationId xmlns:a16="http://schemas.microsoft.com/office/drawing/2014/main" id="{0997B57B-04C9-4086-8142-F1C5F418C159}"/>
+                </a:ext>
+              </a:extLst>
+            </p:cNvPr>
+            <p:cNvSpPr/>
+            <p:nvPr/>
+          </p:nvSpPr>
+          <p:spPr>
+            <a:xfrm>
+              <a:off x="5072001" y="2610815"/>
+              <a:ext cx="288032" cy="288032"/>
+            </a:xfrm>
+            <a:prstGeom prst="ellipse">
+              <a:avLst/>
+            </a:prstGeom>
+            <a:solidFill>
+              <a:schemeClr val="accent1"/>
+            </a:solidFill>
+            <a:ln>
+              <a:noFill/>
+            </a:ln>
+          </p:spPr>
+          <p:style>
+            <a:lnRef idx="2">
+              <a:schemeClr val="accent1">
+                <a:shade val="50000"/>
+              </a:schemeClr>
+            </a:lnRef>
+            <a:fillRef idx="1">
+              <a:schemeClr val="accent1"/>
+            </a:fillRef>
+            <a:effectRef idx="0">
+              <a:schemeClr val="accent1"/>
+            </a:effectRef>
+            <a:fontRef idx="minor">
+              <a:schemeClr val="lt1"/>
+            </a:fontRef>
+          </p:style>
+          <p:txBody>
+            <a:bodyPr rtlCol="0" anchor="ctr"/>
+            <a:lstStyle/>
+            <a:p>
+              <a:pPr algn="ctr"/>
+              <a:endParaRPr lang="ko-KR" altLang="en-US" sz="2700"/>
+            </a:p>
+          </p:txBody>
+        </p:sp>
+        <p:sp>
+          <p:nvSpPr>
+            <p:cNvPr id="8" name="Oval 7">
+              <a:extLst>
+                <a:ext uri="{FF2B5EF4-FFF2-40B4-BE49-F238E27FC236}">
+                  <a16:creationId xmlns:a16="http://schemas.microsoft.com/office/drawing/2014/main" id="{C8C31F85-1511-4F20-83FA-F1F8BCA442E1}"/>
+                </a:ext>
+              </a:extLst>
+            </p:cNvPr>
+            <p:cNvSpPr/>
+            <p:nvPr/>
+          </p:nvSpPr>
+          <p:spPr>
+            <a:xfrm>
+              <a:off x="5049075" y="4941168"/>
+              <a:ext cx="288032" cy="288032"/>
+            </a:xfrm>
+            <a:prstGeom prst="ellipse">
+              <a:avLst/>
+            </a:prstGeom>
+            <a:solidFill>
+              <a:schemeClr val="accent3"/>
+            </a:solidFill>
+            <a:ln>
+              <a:noFill/>
+            </a:ln>
+          </p:spPr>
+          <p:style>
+            <a:lnRef idx="2">
+              <a:schemeClr val="accent1">
+                <a:shade val="50000"/>
+              </a:schemeClr>
+            </a:lnRef>
+            <a:fillRef idx="1">
+              <a:schemeClr val="accent1"/>
+            </a:fillRef>
+            <a:effectRef idx="0">
+              <a:schemeClr val="accent1"/>
+            </a:effectRef>
+            <a:fontRef idx="minor">
+              <a:schemeClr val="lt1"/>
+            </a:fontRef>
+          </p:style>
+          <p:txBody>
+            <a:bodyPr rtlCol="0" anchor="ctr"/>
+            <a:lstStyle/>
+            <a:p>
+              <a:pPr algn="ctr"/>
+              <a:endParaRPr lang="ko-KR" altLang="en-US" sz="2700"/>
+            </a:p>
+          </p:txBody>
+        </p:sp>
+      </p:grpSp>
+      <p:sp>
+        <p:nvSpPr>
+          <p:cNvPr id="11" name="TextBox 10">
+            <a:extLst>
+              <a:ext uri="{FF2B5EF4-FFF2-40B4-BE49-F238E27FC236}">
+                <a16:creationId xmlns:a16="http://schemas.microsoft.com/office/drawing/2014/main" id="{E8AD0520-2116-4FC0-9CAE-F4CB8AE6732E}"/>
+              </a:ext>
+            </a:extLst>
+          </p:cNvPr>
+          <p:cNvSpPr txBox="1"/>
+          <p:nvPr/>
+        </p:nvSpPr>
+        <p:spPr>
+          <a:xfrm>
+            <a:off x="5832711" y="1536306"/>
+            <a:ext cx="4623159" cy="646331"/>
+          </a:xfrm>
+          <a:prstGeom prst="rect">
+            <a:avLst/>
+          </a:prstGeom>
+          <a:noFill/>
+        </p:spPr>
+        <p:txBody>
+          <a:bodyPr wrap="square" rtlCol="0">
+            <a:spAutoFit/>
+          </a:bodyPr>
+          <a:lstStyle/>
+          <a:p>
+            <a:r>
+              <a:rPr lang="fr-FR" altLang="ko-KR" b="1" dirty="0">
+                <a:solidFill>
+                  <a:schemeClr val="bg1"/>
+                </a:solidFill>
+                <a:cs typeface="Arial" pitchFamily="34" charset="0"/>
+              </a:rPr>
+              <a:t>Permet de donner une vision globale du comportement  d’un système </a:t>
+            </a:r>
+            <a:endParaRPr lang="ko-KR" altLang="en-US" b="1" dirty="0">
+              <a:solidFill>
+                <a:schemeClr val="bg1"/>
+              </a:solidFill>
+              <a:cs typeface="Arial" pitchFamily="34" charset="0"/>
+            </a:endParaRPr>
+          </a:p>
+        </p:txBody>
+      </p:sp>
+      <p:grpSp>
+        <p:nvGrpSpPr>
+          <p:cNvPr id="15" name="Group 14">
+            <a:extLst>
+              <a:ext uri="{FF2B5EF4-FFF2-40B4-BE49-F238E27FC236}">
+                <a16:creationId xmlns:a16="http://schemas.microsoft.com/office/drawing/2014/main" id="{81326ED9-24E5-4182-8DE7-82180F02404B}"/>
+              </a:ext>
+            </a:extLst>
+          </p:cNvPr>
+          <p:cNvGrpSpPr/>
+          <p:nvPr/>
+        </p:nvGrpSpPr>
+        <p:grpSpPr>
+          <a:xfrm>
+            <a:off x="6406065" y="2437183"/>
+            <a:ext cx="4623159" cy="646331"/>
+            <a:chOff x="4965552" y="1736224"/>
+            <a:chExt cx="3484978" cy="646331"/>
+          </a:xfrm>
+        </p:grpSpPr>
+        <p:sp>
+          <p:nvSpPr>
+            <p:cNvPr id="16" name="TextBox 15">
+              <a:extLst>
+                <a:ext uri="{FF2B5EF4-FFF2-40B4-BE49-F238E27FC236}">
+                  <a16:creationId xmlns:a16="http://schemas.microsoft.com/office/drawing/2014/main" id="{F5A6116F-18EA-4E03-A8BD-40557322D8E3}"/>
+                </a:ext>
+              </a:extLst>
+            </p:cNvPr>
+            <p:cNvSpPr txBox="1"/>
+            <p:nvPr/>
+          </p:nvSpPr>
+          <p:spPr>
+            <a:xfrm>
+              <a:off x="4965552" y="2001302"/>
+              <a:ext cx="3484978" cy="276999"/>
+            </a:xfrm>
+            <a:prstGeom prst="rect">
+              <a:avLst/>
+            </a:prstGeom>
+            <a:noFill/>
+          </p:spPr>
+          <p:txBody>
+            <a:bodyPr wrap="square" rtlCol="0">
+              <a:spAutoFit/>
+            </a:bodyPr>
+            <a:lstStyle/>
+            <a:p>
+              <a:endParaRPr lang="ko-KR" altLang="en-US" sz="1200" dirty="0">
+                <a:solidFill>
+                  <a:schemeClr val="bg1"/>
+                </a:solidFill>
+                <a:cs typeface="Arial" pitchFamily="34" charset="0"/>
+              </a:endParaRPr>
+            </a:p>
+          </p:txBody>
+        </p:sp>
+        <p:sp>
+          <p:nvSpPr>
+            <p:cNvPr id="17" name="TextBox 16">
+              <a:extLst>
+                <a:ext uri="{FF2B5EF4-FFF2-40B4-BE49-F238E27FC236}">
+                  <a16:creationId xmlns:a16="http://schemas.microsoft.com/office/drawing/2014/main" id="{D3496B0B-8027-40FB-ABFA-11E30FAA11CA}"/>
+                </a:ext>
+              </a:extLst>
+            </p:cNvPr>
+            <p:cNvSpPr txBox="1"/>
+            <p:nvPr/>
+          </p:nvSpPr>
+          <p:spPr>
+            <a:xfrm>
+              <a:off x="4965552" y="1736224"/>
+              <a:ext cx="3484978" cy="646331"/>
+            </a:xfrm>
+            <a:prstGeom prst="rect">
+              <a:avLst/>
+            </a:prstGeom>
+            <a:noFill/>
+          </p:spPr>
+          <p:txBody>
+            <a:bodyPr wrap="square" rtlCol="0">
+              <a:spAutoFit/>
+            </a:bodyPr>
+            <a:lstStyle/>
+            <a:p>
+              <a:r>
+                <a:rPr lang="en-US" altLang="ko-KR" b="1" dirty="0">
+                  <a:solidFill>
+                    <a:schemeClr val="bg1"/>
+                  </a:solidFill>
+                  <a:cs typeface="Arial" pitchFamily="34" charset="0"/>
+                </a:rPr>
+                <a:t>Les </a:t>
+              </a:r>
+              <a:r>
+                <a:rPr lang="en-US" altLang="ko-KR" b="1" dirty="0" err="1">
+                  <a:solidFill>
+                    <a:schemeClr val="bg1"/>
+                  </a:solidFill>
+                  <a:cs typeface="Arial" pitchFamily="34" charset="0"/>
+                </a:rPr>
+                <a:t>utilisateurs</a:t>
+              </a:r>
+              <a:r>
+                <a:rPr lang="en-US" altLang="ko-KR" b="1" dirty="0">
+                  <a:solidFill>
+                    <a:schemeClr val="bg1"/>
+                  </a:solidFill>
+                  <a:cs typeface="Arial" pitchFamily="34" charset="0"/>
+                </a:rPr>
+                <a:t> </a:t>
+              </a:r>
+              <a:r>
+                <a:rPr lang="en-US" altLang="ko-KR" b="1" dirty="0" err="1">
+                  <a:solidFill>
+                    <a:schemeClr val="bg1"/>
+                  </a:solidFill>
+                  <a:cs typeface="Arial" pitchFamily="34" charset="0"/>
+                </a:rPr>
+                <a:t>ou</a:t>
+              </a:r>
+              <a:r>
+                <a:rPr lang="en-US" altLang="ko-KR" b="1" dirty="0">
+                  <a:solidFill>
+                    <a:schemeClr val="bg1"/>
+                  </a:solidFill>
+                  <a:cs typeface="Arial" pitchFamily="34" charset="0"/>
+                </a:rPr>
+                <a:t> “</a:t>
+              </a:r>
+              <a:r>
+                <a:rPr lang="en-US" altLang="ko-KR" b="1" dirty="0" err="1">
+                  <a:solidFill>
+                    <a:schemeClr val="bg1"/>
+                  </a:solidFill>
+                  <a:cs typeface="Arial" pitchFamily="34" charset="0"/>
+                </a:rPr>
+                <a:t>Acteurs</a:t>
+              </a:r>
+              <a:r>
+                <a:rPr lang="en-US" altLang="ko-KR" b="1" dirty="0">
+                  <a:solidFill>
+                    <a:schemeClr val="bg1"/>
+                  </a:solidFill>
+                  <a:cs typeface="Arial" pitchFamily="34" charset="0"/>
+                </a:rPr>
+                <a:t>” </a:t>
+              </a:r>
+              <a:r>
+                <a:rPr lang="en-US" altLang="ko-KR" b="1" dirty="0" err="1">
+                  <a:solidFill>
+                    <a:schemeClr val="bg1"/>
+                  </a:solidFill>
+                  <a:cs typeface="Arial" pitchFamily="34" charset="0"/>
+                </a:rPr>
+                <a:t>interagissent</a:t>
+              </a:r>
+              <a:r>
+                <a:rPr lang="en-US" altLang="ko-KR" b="1" dirty="0">
+                  <a:solidFill>
+                    <a:schemeClr val="bg1"/>
+                  </a:solidFill>
+                  <a:cs typeface="Arial" pitchFamily="34" charset="0"/>
+                </a:rPr>
+                <a:t> avec les </a:t>
+              </a:r>
+              <a:r>
+                <a:rPr lang="en-US" altLang="ko-KR" b="1" dirty="0" err="1">
+                  <a:solidFill>
+                    <a:schemeClr val="bg1"/>
+                  </a:solidFill>
+                  <a:cs typeface="Arial" pitchFamily="34" charset="0"/>
+                </a:rPr>
+                <a:t>cas</a:t>
+              </a:r>
+              <a:r>
+                <a:rPr lang="en-US" altLang="ko-KR" b="1" dirty="0">
+                  <a:solidFill>
+                    <a:schemeClr val="bg1"/>
+                  </a:solidFill>
+                  <a:cs typeface="Arial" pitchFamily="34" charset="0"/>
+                </a:rPr>
+                <a:t> </a:t>
+              </a:r>
+              <a:r>
+                <a:rPr lang="en-US" altLang="ko-KR" b="1" dirty="0" err="1">
+                  <a:solidFill>
+                    <a:schemeClr val="bg1"/>
+                  </a:solidFill>
+                  <a:cs typeface="Arial" pitchFamily="34" charset="0"/>
+                </a:rPr>
+                <a:t>d’utilisations</a:t>
+              </a:r>
+              <a:r>
+                <a:rPr lang="en-US" altLang="ko-KR" b="1" dirty="0">
+                  <a:solidFill>
+                    <a:schemeClr val="bg1"/>
+                  </a:solidFill>
+                  <a:cs typeface="Arial" pitchFamily="34" charset="0"/>
+                </a:rPr>
+                <a:t> </a:t>
+              </a:r>
+              <a:endParaRPr lang="ko-KR" altLang="en-US" b="1" dirty="0">
+                <a:solidFill>
+                  <a:schemeClr val="bg1"/>
+                </a:solidFill>
+                <a:cs typeface="Arial" pitchFamily="34" charset="0"/>
+              </a:endParaRPr>
+            </a:p>
+          </p:txBody>
+        </p:sp>
+      </p:grpSp>
+      <p:grpSp>
+        <p:nvGrpSpPr>
+          <p:cNvPr id="27" name="그룹 3">
+            <a:extLst>
+              <a:ext uri="{FF2B5EF4-FFF2-40B4-BE49-F238E27FC236}">
+                <a16:creationId xmlns:a16="http://schemas.microsoft.com/office/drawing/2014/main" id="{B26F5175-49BB-43FA-BB34-AAE326C3F67C}"/>
+              </a:ext>
+            </a:extLst>
+          </p:cNvPr>
+          <p:cNvGrpSpPr/>
+          <p:nvPr/>
+        </p:nvGrpSpPr>
+        <p:grpSpPr>
+          <a:xfrm>
+            <a:off x="1242221" y="1792441"/>
+            <a:ext cx="4250497" cy="4250497"/>
+            <a:chOff x="735328" y="1762623"/>
+            <a:chExt cx="4250497" cy="4250497"/>
+          </a:xfrm>
+        </p:grpSpPr>
+        <p:sp>
+          <p:nvSpPr>
+            <p:cNvPr id="28" name="Block Arc 27">
+              <a:extLst>
+                <a:ext uri="{FF2B5EF4-FFF2-40B4-BE49-F238E27FC236}">
+                  <a16:creationId xmlns:a16="http://schemas.microsoft.com/office/drawing/2014/main" id="{10D51085-B919-482D-AC2A-D1CFCA61FC33}"/>
+                </a:ext>
+              </a:extLst>
+            </p:cNvPr>
+            <p:cNvSpPr/>
+            <p:nvPr/>
+          </p:nvSpPr>
+          <p:spPr>
+            <a:xfrm>
+              <a:off x="735328" y="1762623"/>
+              <a:ext cx="4250497" cy="4250497"/>
+            </a:xfrm>
+            <a:prstGeom prst="blockArc">
+              <a:avLst>
+                <a:gd name="adj1" fmla="val 4228396"/>
+                <a:gd name="adj2" fmla="val 7060926"/>
+                <a:gd name="adj3" fmla="val 5247"/>
+              </a:avLst>
+            </a:prstGeom>
+            <a:solidFill>
+              <a:schemeClr val="accent4"/>
+            </a:solidFill>
+            <a:ln>
+              <a:noFill/>
+            </a:ln>
+          </p:spPr>
+          <p:style>
+            <a:lnRef idx="2">
+              <a:schemeClr val="accent1">
+                <a:shade val="50000"/>
+              </a:schemeClr>
+            </a:lnRef>
+            <a:fillRef idx="1">
+              <a:schemeClr val="accent1"/>
+            </a:fillRef>
+            <a:effectRef idx="0">
+              <a:schemeClr val="accent1"/>
+            </a:effectRef>
+            <a:fontRef idx="minor">
+              <a:schemeClr val="lt1"/>
+            </a:fontRef>
+          </p:style>
+          <p:txBody>
+            <a:bodyPr rtlCol="0" anchor="ctr"/>
+            <a:lstStyle/>
+            <a:p>
+              <a:pPr algn="ctr"/>
+              <a:endParaRPr lang="ko-KR" altLang="en-US" sz="2700">
+                <a:solidFill>
+                  <a:schemeClr val="tx1"/>
+                </a:solidFill>
+              </a:endParaRPr>
+            </a:p>
+          </p:txBody>
+        </p:sp>
+        <p:sp>
+          <p:nvSpPr>
+            <p:cNvPr id="29" name="Block Arc 28">
+              <a:extLst>
+                <a:ext uri="{FF2B5EF4-FFF2-40B4-BE49-F238E27FC236}">
+                  <a16:creationId xmlns:a16="http://schemas.microsoft.com/office/drawing/2014/main" id="{99B3B08C-2DAD-4A2C-9614-3D5D7DE0C8FC}"/>
+                </a:ext>
+              </a:extLst>
+            </p:cNvPr>
+            <p:cNvSpPr/>
+            <p:nvPr/>
+          </p:nvSpPr>
+          <p:spPr>
+            <a:xfrm>
+              <a:off x="735328" y="1762623"/>
+              <a:ext cx="4250497" cy="4250497"/>
+            </a:xfrm>
+            <a:prstGeom prst="blockArc">
+              <a:avLst>
+                <a:gd name="adj1" fmla="val 1492588"/>
+                <a:gd name="adj2" fmla="val 4237585"/>
+                <a:gd name="adj3" fmla="val 5220"/>
+              </a:avLst>
+            </a:prstGeom>
+            <a:solidFill>
+              <a:schemeClr val="accent3"/>
+            </a:solidFill>
+            <a:ln>
+              <a:noFill/>
+            </a:ln>
+          </p:spPr>
+          <p:style>
+            <a:lnRef idx="2">
+              <a:schemeClr val="accent1">
+                <a:shade val="50000"/>
+              </a:schemeClr>
+            </a:lnRef>
+            <a:fillRef idx="1">
+              <a:schemeClr val="accent1"/>
+            </a:fillRef>
+            <a:effectRef idx="0">
+              <a:schemeClr val="accent1"/>
+            </a:effectRef>
+            <a:fontRef idx="minor">
+              <a:schemeClr val="lt1"/>
+            </a:fontRef>
+          </p:style>
+          <p:txBody>
+            <a:bodyPr rtlCol="0" anchor="ctr"/>
+            <a:lstStyle/>
+            <a:p>
+              <a:pPr algn="ctr"/>
+              <a:endParaRPr lang="ko-KR" altLang="en-US" sz="2700">
+                <a:solidFill>
+                  <a:schemeClr val="tx1"/>
+                </a:solidFill>
+              </a:endParaRPr>
+            </a:p>
+          </p:txBody>
+        </p:sp>
+        <p:sp>
+          <p:nvSpPr>
+            <p:cNvPr id="30" name="Block Arc 29">
+              <a:extLst>
+                <a:ext uri="{FF2B5EF4-FFF2-40B4-BE49-F238E27FC236}">
+                  <a16:creationId xmlns:a16="http://schemas.microsoft.com/office/drawing/2014/main" id="{A6A6D8C2-0D8B-4B84-9B64-E00D2B52404A}"/>
+                </a:ext>
+              </a:extLst>
+            </p:cNvPr>
+            <p:cNvSpPr/>
+            <p:nvPr/>
+          </p:nvSpPr>
+          <p:spPr>
+            <a:xfrm>
+              <a:off x="735328" y="1762623"/>
+              <a:ext cx="4250497" cy="4250497"/>
+            </a:xfrm>
+            <a:prstGeom prst="blockArc">
+              <a:avLst>
+                <a:gd name="adj1" fmla="val 20334074"/>
+                <a:gd name="adj2" fmla="val 1503961"/>
+                <a:gd name="adj3" fmla="val 5284"/>
+              </a:avLst>
+            </a:prstGeom>
+            <a:solidFill>
+              <a:schemeClr val="accent2"/>
+            </a:solidFill>
+            <a:ln>
+              <a:noFill/>
+            </a:ln>
+          </p:spPr>
+          <p:style>
+            <a:lnRef idx="2">
+              <a:schemeClr val="accent1">
+                <a:shade val="50000"/>
+              </a:schemeClr>
+            </a:lnRef>
+            <a:fillRef idx="1">
+              <a:schemeClr val="accent1"/>
+            </a:fillRef>
+            <a:effectRef idx="0">
+              <a:schemeClr val="accent1"/>
+            </a:effectRef>
+            <a:fontRef idx="minor">
+              <a:schemeClr val="lt1"/>
+            </a:fontRef>
+          </p:style>
+          <p:txBody>
+            <a:bodyPr rtlCol="0" anchor="ctr"/>
+            <a:lstStyle/>
+            <a:p>
+              <a:pPr algn="ctr"/>
+              <a:endParaRPr lang="ko-KR" altLang="en-US" sz="2700">
+                <a:solidFill>
+                  <a:schemeClr val="tx1"/>
+                </a:solidFill>
+              </a:endParaRPr>
+            </a:p>
+          </p:txBody>
+        </p:sp>
+        <p:sp>
+          <p:nvSpPr>
+            <p:cNvPr id="31" name="Block Arc 30">
+              <a:extLst>
+                <a:ext uri="{FF2B5EF4-FFF2-40B4-BE49-F238E27FC236}">
+                  <a16:creationId xmlns:a16="http://schemas.microsoft.com/office/drawing/2014/main" id="{560DAC13-F053-46DC-B6AE-46FAA1FC2690}"/>
+                </a:ext>
+              </a:extLst>
+            </p:cNvPr>
+            <p:cNvSpPr/>
+            <p:nvPr/>
+          </p:nvSpPr>
+          <p:spPr>
+            <a:xfrm>
+              <a:off x="735328" y="1762623"/>
+              <a:ext cx="4250497" cy="4250497"/>
+            </a:xfrm>
+            <a:prstGeom prst="blockArc">
+              <a:avLst>
+                <a:gd name="adj1" fmla="val 17549958"/>
+                <a:gd name="adj2" fmla="val 20340767"/>
+                <a:gd name="adj3" fmla="val 5288"/>
+              </a:avLst>
+            </a:prstGeom>
+            <a:solidFill>
+              <a:schemeClr val="accent1"/>
+            </a:solidFill>
+            <a:ln>
+              <a:noFill/>
+            </a:ln>
+          </p:spPr>
+          <p:style>
+            <a:lnRef idx="2">
+              <a:schemeClr val="accent1">
+                <a:shade val="50000"/>
+              </a:schemeClr>
+            </a:lnRef>
+            <a:fillRef idx="1">
+              <a:schemeClr val="accent1"/>
+            </a:fillRef>
+            <a:effectRef idx="0">
+              <a:schemeClr val="accent1"/>
+            </a:effectRef>
+            <a:fontRef idx="minor">
+              <a:schemeClr val="lt1"/>
+            </a:fontRef>
+          </p:style>
+          <p:txBody>
+            <a:bodyPr rtlCol="0" anchor="ctr"/>
+            <a:lstStyle/>
+            <a:p>
+              <a:pPr algn="ctr"/>
+              <a:endParaRPr lang="ko-KR" altLang="en-US" sz="2700">
+                <a:solidFill>
+                  <a:schemeClr val="tx1"/>
+                </a:solidFill>
+              </a:endParaRPr>
+            </a:p>
+          </p:txBody>
+        </p:sp>
+        <p:sp>
+          <p:nvSpPr>
+            <p:cNvPr id="32" name="Block Arc 5">
+              <a:extLst>
+                <a:ext uri="{FF2B5EF4-FFF2-40B4-BE49-F238E27FC236}">
+                  <a16:creationId xmlns:a16="http://schemas.microsoft.com/office/drawing/2014/main" id="{6BF9E105-1EAB-4173-888C-1F0EEBD62591}"/>
+                </a:ext>
+              </a:extLst>
+            </p:cNvPr>
+            <p:cNvSpPr/>
+            <p:nvPr/>
+          </p:nvSpPr>
+          <p:spPr>
+            <a:xfrm>
+              <a:off x="735328" y="1762623"/>
+              <a:ext cx="4250497" cy="4250497"/>
+            </a:xfrm>
+            <a:prstGeom prst="blockArc">
+              <a:avLst>
+                <a:gd name="adj1" fmla="val 14520241"/>
+                <a:gd name="adj2" fmla="val 17553267"/>
+                <a:gd name="adj3" fmla="val 5243"/>
+              </a:avLst>
+            </a:prstGeom>
+            <a:solidFill>
+              <a:schemeClr val="accent6"/>
+            </a:solidFill>
+            <a:ln>
+              <a:noFill/>
+            </a:ln>
+          </p:spPr>
+          <p:style>
+            <a:lnRef idx="2">
+              <a:schemeClr val="accent1">
+                <a:shade val="50000"/>
+              </a:schemeClr>
+            </a:lnRef>
+            <a:fillRef idx="1">
+              <a:schemeClr val="accent1"/>
+            </a:fillRef>
+            <a:effectRef idx="0">
+              <a:schemeClr val="accent1"/>
+            </a:effectRef>
+            <a:fontRef idx="minor">
+              <a:schemeClr val="lt1"/>
+            </a:fontRef>
+          </p:style>
+          <p:txBody>
+            <a:bodyPr rtlCol="0" anchor="ctr"/>
+            <a:lstStyle/>
+            <a:p>
+              <a:pPr algn="ctr"/>
+              <a:endParaRPr lang="ko-KR" altLang="en-US" sz="2700" dirty="0">
+                <a:solidFill>
+                  <a:schemeClr val="tx1"/>
+                </a:solidFill>
+              </a:endParaRPr>
+            </a:p>
+          </p:txBody>
+        </p:sp>
+      </p:grpSp>
+      <p:sp>
+        <p:nvSpPr>
+          <p:cNvPr id="33" name="Text Placeholder 32">
+            <a:extLst>
+              <a:ext uri="{FF2B5EF4-FFF2-40B4-BE49-F238E27FC236}">
+                <a16:creationId xmlns:a16="http://schemas.microsoft.com/office/drawing/2014/main" id="{500B7DC1-4390-40EC-B83A-416B373086C2}"/>
+              </a:ext>
+            </a:extLst>
+          </p:cNvPr>
+          <p:cNvSpPr>
+            <a:spLocks noGrp="1"/>
+          </p:cNvSpPr>
+          <p:nvPr>
+            <p:ph type="body" sz="quarter" idx="10"/>
+          </p:nvPr>
+        </p:nvSpPr>
+        <p:spPr/>
+        <p:txBody>
+          <a:bodyPr/>
+          <a:lstStyle/>
+          <a:p>
+            <a:r>
+              <a:rPr lang="en-US" dirty="0" err="1"/>
+              <a:t>Diagramme</a:t>
+            </a:r>
+            <a:r>
+              <a:rPr lang="en-US" dirty="0"/>
+              <a:t> </a:t>
+            </a:r>
+            <a:r>
+              <a:rPr lang="en-US" dirty="0" err="1"/>
+              <a:t>d’utilisations</a:t>
+            </a:r>
+            <a:endParaRPr lang="en-US" dirty="0"/>
+          </a:p>
+        </p:txBody>
+      </p:sp>
+      <p:grpSp>
+        <p:nvGrpSpPr>
+          <p:cNvPr id="34" name="Group 14">
+            <a:extLst>
+              <a:ext uri="{FF2B5EF4-FFF2-40B4-BE49-F238E27FC236}">
+                <a16:creationId xmlns:a16="http://schemas.microsoft.com/office/drawing/2014/main" id="{36622002-0BCC-4B4C-9431-E5E5CA92FE59}"/>
+              </a:ext>
+            </a:extLst>
+          </p:cNvPr>
+          <p:cNvGrpSpPr/>
+          <p:nvPr/>
+        </p:nvGrpSpPr>
+        <p:grpSpPr>
+          <a:xfrm>
+            <a:off x="6549932" y="3718400"/>
+            <a:ext cx="4623159" cy="923330"/>
+            <a:chOff x="4965552" y="1736224"/>
+            <a:chExt cx="3484978" cy="923330"/>
+          </a:xfrm>
+        </p:grpSpPr>
+        <p:sp>
+          <p:nvSpPr>
+            <p:cNvPr id="36" name="TextBox 15">
+              <a:extLst>
+                <a:ext uri="{FF2B5EF4-FFF2-40B4-BE49-F238E27FC236}">
+                  <a16:creationId xmlns:a16="http://schemas.microsoft.com/office/drawing/2014/main" id="{F30F3462-060D-47E3-B8FA-64032DC3655B}"/>
+                </a:ext>
+              </a:extLst>
+            </p:cNvPr>
+            <p:cNvSpPr txBox="1"/>
+            <p:nvPr/>
+          </p:nvSpPr>
+          <p:spPr>
+            <a:xfrm>
+              <a:off x="4965552" y="2001302"/>
+              <a:ext cx="3484978" cy="276999"/>
+            </a:xfrm>
+            <a:prstGeom prst="rect">
+              <a:avLst/>
+            </a:prstGeom>
+            <a:noFill/>
+          </p:spPr>
+          <p:txBody>
+            <a:bodyPr wrap="square" rtlCol="0">
+              <a:spAutoFit/>
+            </a:bodyPr>
+            <a:lstStyle/>
+            <a:p>
+              <a:endParaRPr lang="ko-KR" altLang="en-US" sz="1200" dirty="0">
+                <a:solidFill>
+                  <a:schemeClr val="bg1"/>
+                </a:solidFill>
+                <a:cs typeface="Arial" pitchFamily="34" charset="0"/>
+              </a:endParaRPr>
+            </a:p>
+          </p:txBody>
+        </p:sp>
+        <p:sp>
+          <p:nvSpPr>
+            <p:cNvPr id="37" name="TextBox 16">
+              <a:extLst>
+                <a:ext uri="{FF2B5EF4-FFF2-40B4-BE49-F238E27FC236}">
+                  <a16:creationId xmlns:a16="http://schemas.microsoft.com/office/drawing/2014/main" id="{83515874-34DD-42F0-9371-F8FDA8BFF019}"/>
+                </a:ext>
+              </a:extLst>
+            </p:cNvPr>
+            <p:cNvSpPr txBox="1"/>
+            <p:nvPr/>
+          </p:nvSpPr>
+          <p:spPr>
+            <a:xfrm>
+              <a:off x="4965552" y="1736224"/>
+              <a:ext cx="3484978" cy="923330"/>
+            </a:xfrm>
+            <a:prstGeom prst="rect">
+              <a:avLst/>
+            </a:prstGeom>
+            <a:noFill/>
+          </p:spPr>
+          <p:txBody>
+            <a:bodyPr wrap="square" rtlCol="0">
+              <a:spAutoFit/>
+            </a:bodyPr>
+            <a:lstStyle/>
+            <a:p>
+              <a:r>
+                <a:rPr lang="en-US" altLang="ko-KR" b="1" dirty="0">
+                  <a:solidFill>
+                    <a:schemeClr val="bg1"/>
+                  </a:solidFill>
+                  <a:cs typeface="Arial" pitchFamily="34" charset="0"/>
+                </a:rPr>
+                <a:t>Me </a:t>
+              </a:r>
+              <a:r>
+                <a:rPr lang="en-US" altLang="ko-KR" b="1" dirty="0" err="1">
+                  <a:solidFill>
+                    <a:schemeClr val="bg1"/>
+                  </a:solidFill>
+                  <a:cs typeface="Arial" pitchFamily="34" charset="0"/>
+                </a:rPr>
+                <a:t>permet</a:t>
+              </a:r>
+              <a:r>
+                <a:rPr lang="en-US" altLang="ko-KR" b="1" dirty="0">
+                  <a:solidFill>
+                    <a:schemeClr val="bg1"/>
+                  </a:solidFill>
+                  <a:cs typeface="Arial" pitchFamily="34" charset="0"/>
+                </a:rPr>
+                <a:t> de lister les </a:t>
+              </a:r>
+              <a:r>
+                <a:rPr lang="en-US" altLang="ko-KR" b="1" dirty="0" err="1">
+                  <a:solidFill>
+                    <a:schemeClr val="bg1"/>
+                  </a:solidFill>
+                  <a:cs typeface="Arial" pitchFamily="34" charset="0"/>
+                </a:rPr>
+                <a:t>acteurs</a:t>
+              </a:r>
+              <a:r>
+                <a:rPr lang="en-US" altLang="ko-KR" b="1" dirty="0">
+                  <a:solidFill>
+                    <a:schemeClr val="bg1"/>
+                  </a:solidFill>
+                  <a:cs typeface="Arial" pitchFamily="34" charset="0"/>
+                </a:rPr>
+                <a:t> et les </a:t>
+              </a:r>
+              <a:r>
+                <a:rPr lang="en-US" altLang="ko-KR" b="1" dirty="0" err="1">
+                  <a:solidFill>
+                    <a:schemeClr val="bg1"/>
+                  </a:solidFill>
+                  <a:cs typeface="Arial" pitchFamily="34" charset="0"/>
+                </a:rPr>
+                <a:t>potentiels</a:t>
+              </a:r>
+              <a:r>
+                <a:rPr lang="en-US" altLang="ko-KR" b="1" dirty="0">
+                  <a:solidFill>
+                    <a:schemeClr val="bg1"/>
+                  </a:solidFill>
+                  <a:cs typeface="Arial" pitchFamily="34" charset="0"/>
+                </a:rPr>
+                <a:t> </a:t>
+              </a:r>
+              <a:r>
+                <a:rPr lang="en-US" altLang="ko-KR" b="1" dirty="0" err="1">
+                  <a:solidFill>
+                    <a:schemeClr val="bg1"/>
+                  </a:solidFill>
+                  <a:cs typeface="Arial" pitchFamily="34" charset="0"/>
+                </a:rPr>
+                <a:t>statuts</a:t>
+              </a:r>
+              <a:r>
+                <a:rPr lang="en-US" altLang="ko-KR" b="1" dirty="0">
+                  <a:solidFill>
+                    <a:schemeClr val="bg1"/>
+                  </a:solidFill>
+                  <a:cs typeface="Arial" pitchFamily="34" charset="0"/>
+                </a:rPr>
+                <a:t> </a:t>
+              </a:r>
+              <a:r>
+                <a:rPr lang="en-US" altLang="ko-KR" b="1" dirty="0" err="1">
+                  <a:solidFill>
+                    <a:schemeClr val="bg1"/>
+                  </a:solidFill>
+                  <a:cs typeface="Arial" pitchFamily="34" charset="0"/>
+                </a:rPr>
+                <a:t>qu’il</a:t>
+              </a:r>
+              <a:r>
+                <a:rPr lang="en-US" altLang="ko-KR" b="1" dirty="0">
+                  <a:solidFill>
+                    <a:schemeClr val="bg1"/>
+                  </a:solidFill>
+                  <a:cs typeface="Arial" pitchFamily="34" charset="0"/>
+                </a:rPr>
+                <a:t> </a:t>
+              </a:r>
+              <a:r>
+                <a:rPr lang="en-US" altLang="ko-KR" b="1" dirty="0" err="1">
+                  <a:solidFill>
+                    <a:schemeClr val="bg1"/>
+                  </a:solidFill>
+                  <a:cs typeface="Arial" pitchFamily="34" charset="0"/>
+                </a:rPr>
+                <a:t>pourrait</a:t>
+              </a:r>
+              <a:r>
+                <a:rPr lang="en-US" altLang="ko-KR" b="1" dirty="0">
+                  <a:solidFill>
+                    <a:schemeClr val="bg1"/>
+                  </a:solidFill>
+                  <a:cs typeface="Arial" pitchFamily="34" charset="0"/>
+                </a:rPr>
+                <a:t> y </a:t>
+              </a:r>
+              <a:r>
+                <a:rPr lang="en-US" altLang="ko-KR" b="1" dirty="0" err="1">
+                  <a:solidFill>
+                    <a:schemeClr val="bg1"/>
+                  </a:solidFill>
+                  <a:cs typeface="Arial" pitchFamily="34" charset="0"/>
+                </a:rPr>
+                <a:t>avoir</a:t>
+              </a:r>
+              <a:r>
+                <a:rPr lang="en-US" altLang="ko-KR" b="1" dirty="0">
+                  <a:solidFill>
+                    <a:schemeClr val="bg1"/>
+                  </a:solidFill>
+                  <a:cs typeface="Arial" pitchFamily="34" charset="0"/>
+                </a:rPr>
+                <a:t> pour </a:t>
+              </a:r>
+              <a:r>
+                <a:rPr lang="en-US" altLang="ko-KR" b="1" dirty="0" err="1">
+                  <a:solidFill>
+                    <a:schemeClr val="bg1"/>
+                  </a:solidFill>
+                  <a:cs typeface="Arial" pitchFamily="34" charset="0"/>
+                </a:rPr>
+                <a:t>ces</a:t>
+              </a:r>
+              <a:r>
+                <a:rPr lang="en-US" altLang="ko-KR" b="1" dirty="0">
+                  <a:solidFill>
+                    <a:schemeClr val="bg1"/>
+                  </a:solidFill>
+                  <a:cs typeface="Arial" pitchFamily="34" charset="0"/>
+                </a:rPr>
+                <a:t> </a:t>
+              </a:r>
+              <a:r>
+                <a:rPr lang="en-US" altLang="ko-KR" b="1" dirty="0" err="1">
+                  <a:solidFill>
+                    <a:schemeClr val="bg1"/>
+                  </a:solidFill>
+                  <a:cs typeface="Arial" pitchFamily="34" charset="0"/>
+                </a:rPr>
+                <a:t>acteurs</a:t>
+              </a:r>
+              <a:endParaRPr lang="ko-KR" altLang="en-US" b="1" dirty="0">
+                <a:solidFill>
+                  <a:schemeClr val="bg1"/>
+                </a:solidFill>
+                <a:cs typeface="Arial" pitchFamily="34" charset="0"/>
+              </a:endParaRPr>
+            </a:p>
+          </p:txBody>
+        </p:sp>
+      </p:grpSp>
+      <p:sp>
+        <p:nvSpPr>
+          <p:cNvPr id="38" name="TextBox 16">
+            <a:extLst>
+              <a:ext uri="{FF2B5EF4-FFF2-40B4-BE49-F238E27FC236}">
+                <a16:creationId xmlns:a16="http://schemas.microsoft.com/office/drawing/2014/main" id="{814700DF-B518-42BB-9D56-97CA1C0BC865}"/>
+              </a:ext>
+            </a:extLst>
+          </p:cNvPr>
+          <p:cNvSpPr txBox="1"/>
+          <p:nvPr/>
+        </p:nvSpPr>
+        <p:spPr>
+          <a:xfrm>
+            <a:off x="6243182" y="4907284"/>
+            <a:ext cx="4623159" cy="369332"/>
+          </a:xfrm>
+          <a:prstGeom prst="rect">
+            <a:avLst/>
+          </a:prstGeom>
+          <a:noFill/>
+        </p:spPr>
+        <p:txBody>
+          <a:bodyPr wrap="square" rtlCol="0">
+            <a:spAutoFit/>
+          </a:bodyPr>
+          <a:lstStyle/>
+          <a:p>
+            <a:r>
+              <a:rPr lang="en-US" altLang="ko-KR" b="1" dirty="0">
+                <a:solidFill>
+                  <a:schemeClr val="bg1"/>
+                </a:solidFill>
+                <a:cs typeface="Arial" pitchFamily="34" charset="0"/>
+              </a:rPr>
+              <a:t>Me </a:t>
+            </a:r>
+            <a:r>
+              <a:rPr lang="en-US" altLang="ko-KR" b="1" dirty="0" err="1">
+                <a:solidFill>
+                  <a:schemeClr val="bg1"/>
+                </a:solidFill>
+                <a:cs typeface="Arial" pitchFamily="34" charset="0"/>
+              </a:rPr>
+              <a:t>permet</a:t>
+            </a:r>
+            <a:r>
+              <a:rPr lang="en-US" altLang="ko-KR" b="1" dirty="0">
+                <a:solidFill>
+                  <a:schemeClr val="bg1"/>
+                </a:solidFill>
+                <a:cs typeface="Arial" pitchFamily="34" charset="0"/>
+              </a:rPr>
+              <a:t> de lister les actions</a:t>
+            </a:r>
+            <a:endParaRPr lang="ko-KR" altLang="en-US" b="1" dirty="0">
+              <a:solidFill>
+                <a:schemeClr val="bg1"/>
+              </a:solidFill>
+              <a:cs typeface="Arial" pitchFamily="34" charset="0"/>
+            </a:endParaRPr>
+          </a:p>
+        </p:txBody>
+      </p:sp>
+    </p:spTree>
+    <p:extLst>
+      <p:ext uri="{BB962C8B-B14F-4D97-AF65-F5344CB8AC3E}">
+        <p14:creationId xmlns:p14="http://schemas.microsoft.com/office/powerpoint/2010/main" val="2321231529"/>
+      </p:ext>
+    </p:extLst>
+  </p:cSld>
+  <p:clrMapOvr>
+    <a:masterClrMapping/>
+  </p:clrMapOvr>
+</p:sld>
+</file>
+
+<file path=ppt/slides/slide6.xml><?xml version="1.0" encoding="utf-8"?>
+<p:sld xmlns:a="http://schemas.openxmlformats.org/drawingml/2006/main" xmlns:r="http://schemas.openxmlformats.org/officeDocument/2006/relationships" xmlns:p="http://schemas.openxmlformats.org/presentationml/2006/main">
+  <p:cSld>
+    <p:spTree>
+      <p:nvGrpSpPr>
+        <p:cNvPr id="1" name=""/>
+        <p:cNvGrpSpPr/>
+        <p:nvPr/>
+      </p:nvGrpSpPr>
+      <p:grpSpPr>
+        <a:xfrm>
+          <a:off x="0" y="0"/>
+          <a:ext cx="0" cy="0"/>
+          <a:chOff x="0" y="0"/>
+          <a:chExt cx="0" cy="0"/>
+        </a:xfrm>
+      </p:grpSpPr>
+      <p:grpSp>
+        <p:nvGrpSpPr>
+          <p:cNvPr id="2" name="그룹 9">
+            <a:extLst>
+              <a:ext uri="{FF2B5EF4-FFF2-40B4-BE49-F238E27FC236}">
+                <a16:creationId xmlns:a16="http://schemas.microsoft.com/office/drawing/2014/main" id="{1AE4C56C-A95D-4EB1-8C10-69873D6E54E6}"/>
+              </a:ext>
+            </a:extLst>
+          </p:cNvPr>
+          <p:cNvGrpSpPr/>
+          <p:nvPr/>
+        </p:nvGrpSpPr>
+        <p:grpSpPr>
+          <a:xfrm>
             <a:off x="1587417" y="1662467"/>
             <a:ext cx="4652599" cy="4623159"/>
             <a:chOff x="924229" y="1606109"/>
@@ -14445,7 +15755,7 @@
 </p:sld>
 </file>
 
-<file path=ppt/slides/slide6.xml><?xml version="1.0" encoding="utf-8"?>
+<file path=ppt/slides/slide7.xml><?xml version="1.0" encoding="utf-8"?>
 <p:sld xmlns:a="http://schemas.openxmlformats.org/drawingml/2006/main" xmlns:r="http://schemas.openxmlformats.org/officeDocument/2006/relationships" xmlns:p="http://schemas.openxmlformats.org/presentationml/2006/main">
   <p:cSld>
     <p:spTree>
@@ -15661,7 +16971,7 @@
 </p:sld>
 </file>
 
-<file path=ppt/slides/slide7.xml><?xml version="1.0" encoding="utf-8"?>
+<file path=ppt/slides/slide8.xml><?xml version="1.0" encoding="utf-8"?>
 <p:sld xmlns:a="http://schemas.openxmlformats.org/drawingml/2006/main" xmlns:r="http://schemas.openxmlformats.org/officeDocument/2006/relationships" xmlns:p="http://schemas.openxmlformats.org/presentationml/2006/main">
   <p:cSld>
     <p:spTree>
@@ -16956,1316 +18266,6 @@
 </p:sld>
 </file>
 
-<file path=ppt/slides/slide8.xml><?xml version="1.0" encoding="utf-8"?>
-<p:sld xmlns:a="http://schemas.openxmlformats.org/drawingml/2006/main" xmlns:r="http://schemas.openxmlformats.org/officeDocument/2006/relationships" xmlns:p="http://schemas.openxmlformats.org/presentationml/2006/main">
-  <p:cSld>
-    <p:spTree>
-      <p:nvGrpSpPr>
-        <p:cNvPr id="1" name=""/>
-        <p:cNvGrpSpPr/>
-        <p:nvPr/>
-      </p:nvGrpSpPr>
-      <p:grpSpPr>
-        <a:xfrm>
-          <a:off x="0" y="0"/>
-          <a:ext cx="0" cy="0"/>
-          <a:chOff x="0" y="0"/>
-          <a:chExt cx="0" cy="0"/>
-        </a:xfrm>
-      </p:grpSpPr>
-      <p:grpSp>
-        <p:nvGrpSpPr>
-          <p:cNvPr id="2" name="그룹 9">
-            <a:extLst>
-              <a:ext uri="{FF2B5EF4-FFF2-40B4-BE49-F238E27FC236}">
-                <a16:creationId xmlns:a16="http://schemas.microsoft.com/office/drawing/2014/main" id="{1AE4C56C-A95D-4EB1-8C10-69873D6E54E6}"/>
-              </a:ext>
-            </a:extLst>
-          </p:cNvPr>
-          <p:cNvGrpSpPr/>
-          <p:nvPr/>
-        </p:nvGrpSpPr>
-        <p:grpSpPr>
-          <a:xfrm>
-            <a:off x="1431122" y="1606110"/>
-            <a:ext cx="4734219" cy="4623159"/>
-            <a:chOff x="924229" y="1606109"/>
-            <a:chExt cx="4734219" cy="4623159"/>
-          </a:xfrm>
-        </p:grpSpPr>
-        <p:sp>
-          <p:nvSpPr>
-            <p:cNvPr id="3" name="Block Arc 2">
-              <a:extLst>
-                <a:ext uri="{FF2B5EF4-FFF2-40B4-BE49-F238E27FC236}">
-                  <a16:creationId xmlns:a16="http://schemas.microsoft.com/office/drawing/2014/main" id="{C212287D-148A-485C-BF8A-3A1F88F04391}"/>
-                </a:ext>
-              </a:extLst>
-            </p:cNvPr>
-            <p:cNvSpPr/>
-            <p:nvPr/>
-          </p:nvSpPr>
-          <p:spPr>
-            <a:xfrm>
-              <a:off x="924229" y="1606109"/>
-              <a:ext cx="4623159" cy="4623159"/>
-            </a:xfrm>
-            <a:prstGeom prst="blockArc">
-              <a:avLst>
-                <a:gd name="adj1" fmla="val 17994494"/>
-                <a:gd name="adj2" fmla="val 3631056"/>
-                <a:gd name="adj3" fmla="val 1264"/>
-              </a:avLst>
-            </a:prstGeom>
-            <a:solidFill>
-              <a:schemeClr val="bg1">
-                <a:lumMod val="85000"/>
-              </a:schemeClr>
-            </a:solidFill>
-            <a:ln>
-              <a:noFill/>
-            </a:ln>
-          </p:spPr>
-          <p:style>
-            <a:lnRef idx="2">
-              <a:schemeClr val="accent1">
-                <a:shade val="50000"/>
-              </a:schemeClr>
-            </a:lnRef>
-            <a:fillRef idx="1">
-              <a:schemeClr val="accent1"/>
-            </a:fillRef>
-            <a:effectRef idx="0">
-              <a:schemeClr val="accent1"/>
-            </a:effectRef>
-            <a:fontRef idx="minor">
-              <a:schemeClr val="lt1"/>
-            </a:fontRef>
-          </p:style>
-          <p:txBody>
-            <a:bodyPr rtlCol="0" anchor="ctr"/>
-            <a:lstStyle/>
-            <a:p>
-              <a:pPr algn="ctr"/>
-              <a:endParaRPr lang="ko-KR" altLang="en-US" sz="2700">
-                <a:solidFill>
-                  <a:schemeClr val="tx1"/>
-                </a:solidFill>
-              </a:endParaRPr>
-            </a:p>
-          </p:txBody>
-        </p:sp>
-        <p:sp>
-          <p:nvSpPr>
-            <p:cNvPr id="4" name="Oval 3">
-              <a:extLst>
-                <a:ext uri="{FF2B5EF4-FFF2-40B4-BE49-F238E27FC236}">
-                  <a16:creationId xmlns:a16="http://schemas.microsoft.com/office/drawing/2014/main" id="{FAB23284-0952-47BD-A137-FAF9A7ECF454}"/>
-                </a:ext>
-              </a:extLst>
-            </p:cNvPr>
-            <p:cNvSpPr/>
-            <p:nvPr/>
-          </p:nvSpPr>
-          <p:spPr>
-            <a:xfrm>
-              <a:off x="4238091" y="1766259"/>
-              <a:ext cx="288032" cy="288032"/>
-            </a:xfrm>
-            <a:prstGeom prst="ellipse">
-              <a:avLst/>
-            </a:prstGeom>
-            <a:solidFill>
-              <a:schemeClr val="accent6"/>
-            </a:solidFill>
-            <a:ln>
-              <a:noFill/>
-            </a:ln>
-          </p:spPr>
-          <p:style>
-            <a:lnRef idx="2">
-              <a:schemeClr val="accent1">
-                <a:shade val="50000"/>
-              </a:schemeClr>
-            </a:lnRef>
-            <a:fillRef idx="1">
-              <a:schemeClr val="accent1"/>
-            </a:fillRef>
-            <a:effectRef idx="0">
-              <a:schemeClr val="accent1"/>
-            </a:effectRef>
-            <a:fontRef idx="minor">
-              <a:schemeClr val="lt1"/>
-            </a:fontRef>
-          </p:style>
-          <p:txBody>
-            <a:bodyPr rtlCol="0" anchor="ctr"/>
-            <a:lstStyle/>
-            <a:p>
-              <a:pPr algn="ctr"/>
-              <a:endParaRPr lang="ko-KR" altLang="en-US" sz="2700"/>
-            </a:p>
-          </p:txBody>
-        </p:sp>
-        <p:sp>
-          <p:nvSpPr>
-            <p:cNvPr id="5" name="Oval 4">
-              <a:extLst>
-                <a:ext uri="{FF2B5EF4-FFF2-40B4-BE49-F238E27FC236}">
-                  <a16:creationId xmlns:a16="http://schemas.microsoft.com/office/drawing/2014/main" id="{6020D691-FAD5-4B45-A097-6D4210076323}"/>
-                </a:ext>
-              </a:extLst>
-            </p:cNvPr>
-            <p:cNvSpPr/>
-            <p:nvPr/>
-          </p:nvSpPr>
-          <p:spPr>
-            <a:xfrm>
-              <a:off x="5370416" y="3760400"/>
-              <a:ext cx="288032" cy="288032"/>
-            </a:xfrm>
-            <a:prstGeom prst="ellipse">
-              <a:avLst/>
-            </a:prstGeom>
-            <a:solidFill>
-              <a:schemeClr val="accent2"/>
-            </a:solidFill>
-            <a:ln>
-              <a:noFill/>
-            </a:ln>
-          </p:spPr>
-          <p:style>
-            <a:lnRef idx="2">
-              <a:schemeClr val="accent1">
-                <a:shade val="50000"/>
-              </a:schemeClr>
-            </a:lnRef>
-            <a:fillRef idx="1">
-              <a:schemeClr val="accent1"/>
-            </a:fillRef>
-            <a:effectRef idx="0">
-              <a:schemeClr val="accent1"/>
-            </a:effectRef>
-            <a:fontRef idx="minor">
-              <a:schemeClr val="lt1"/>
-            </a:fontRef>
-          </p:style>
-          <p:txBody>
-            <a:bodyPr rtlCol="0" anchor="ctr"/>
-            <a:lstStyle/>
-            <a:p>
-              <a:pPr algn="ctr"/>
-              <a:endParaRPr lang="ko-KR" altLang="en-US" sz="2700"/>
-            </a:p>
-          </p:txBody>
-        </p:sp>
-        <p:sp>
-          <p:nvSpPr>
-            <p:cNvPr id="6" name="Oval 5">
-              <a:extLst>
-                <a:ext uri="{FF2B5EF4-FFF2-40B4-BE49-F238E27FC236}">
-                  <a16:creationId xmlns:a16="http://schemas.microsoft.com/office/drawing/2014/main" id="{260E0257-2299-4795-8DCE-DB07FC19AA57}"/>
-                </a:ext>
-              </a:extLst>
-            </p:cNvPr>
-            <p:cNvSpPr/>
-            <p:nvPr/>
-          </p:nvSpPr>
-          <p:spPr>
-            <a:xfrm>
-              <a:off x="4238091" y="5754540"/>
-              <a:ext cx="288032" cy="288032"/>
-            </a:xfrm>
-            <a:prstGeom prst="ellipse">
-              <a:avLst/>
-            </a:prstGeom>
-            <a:solidFill>
-              <a:schemeClr val="accent4"/>
-            </a:solidFill>
-            <a:ln>
-              <a:noFill/>
-            </a:ln>
-          </p:spPr>
-          <p:style>
-            <a:lnRef idx="2">
-              <a:schemeClr val="accent1">
-                <a:shade val="50000"/>
-              </a:schemeClr>
-            </a:lnRef>
-            <a:fillRef idx="1">
-              <a:schemeClr val="accent1"/>
-            </a:fillRef>
-            <a:effectRef idx="0">
-              <a:schemeClr val="accent1"/>
-            </a:effectRef>
-            <a:fontRef idx="minor">
-              <a:schemeClr val="lt1"/>
-            </a:fontRef>
-          </p:style>
-          <p:txBody>
-            <a:bodyPr rtlCol="0" anchor="ctr"/>
-            <a:lstStyle/>
-            <a:p>
-              <a:pPr algn="ctr"/>
-              <a:endParaRPr lang="ko-KR" altLang="en-US" sz="2700"/>
-            </a:p>
-          </p:txBody>
-        </p:sp>
-        <p:sp>
-          <p:nvSpPr>
-            <p:cNvPr id="7" name="Oval 6">
-              <a:extLst>
-                <a:ext uri="{FF2B5EF4-FFF2-40B4-BE49-F238E27FC236}">
-                  <a16:creationId xmlns:a16="http://schemas.microsoft.com/office/drawing/2014/main" id="{0997B57B-04C9-4086-8142-F1C5F418C159}"/>
-                </a:ext>
-              </a:extLst>
-            </p:cNvPr>
-            <p:cNvSpPr/>
-            <p:nvPr/>
-          </p:nvSpPr>
-          <p:spPr>
-            <a:xfrm>
-              <a:off x="5072001" y="2610815"/>
-              <a:ext cx="288032" cy="288032"/>
-            </a:xfrm>
-            <a:prstGeom prst="ellipse">
-              <a:avLst/>
-            </a:prstGeom>
-            <a:solidFill>
-              <a:schemeClr val="accent1"/>
-            </a:solidFill>
-            <a:ln>
-              <a:noFill/>
-            </a:ln>
-          </p:spPr>
-          <p:style>
-            <a:lnRef idx="2">
-              <a:schemeClr val="accent1">
-                <a:shade val="50000"/>
-              </a:schemeClr>
-            </a:lnRef>
-            <a:fillRef idx="1">
-              <a:schemeClr val="accent1"/>
-            </a:fillRef>
-            <a:effectRef idx="0">
-              <a:schemeClr val="accent1"/>
-            </a:effectRef>
-            <a:fontRef idx="minor">
-              <a:schemeClr val="lt1"/>
-            </a:fontRef>
-          </p:style>
-          <p:txBody>
-            <a:bodyPr rtlCol="0" anchor="ctr"/>
-            <a:lstStyle/>
-            <a:p>
-              <a:pPr algn="ctr"/>
-              <a:endParaRPr lang="ko-KR" altLang="en-US" sz="2700"/>
-            </a:p>
-          </p:txBody>
-        </p:sp>
-        <p:sp>
-          <p:nvSpPr>
-            <p:cNvPr id="8" name="Oval 7">
-              <a:extLst>
-                <a:ext uri="{FF2B5EF4-FFF2-40B4-BE49-F238E27FC236}">
-                  <a16:creationId xmlns:a16="http://schemas.microsoft.com/office/drawing/2014/main" id="{C8C31F85-1511-4F20-83FA-F1F8BCA442E1}"/>
-                </a:ext>
-              </a:extLst>
-            </p:cNvPr>
-            <p:cNvSpPr/>
-            <p:nvPr/>
-          </p:nvSpPr>
-          <p:spPr>
-            <a:xfrm>
-              <a:off x="5049075" y="4941168"/>
-              <a:ext cx="288032" cy="288032"/>
-            </a:xfrm>
-            <a:prstGeom prst="ellipse">
-              <a:avLst/>
-            </a:prstGeom>
-            <a:solidFill>
-              <a:schemeClr val="accent3"/>
-            </a:solidFill>
-            <a:ln>
-              <a:noFill/>
-            </a:ln>
-          </p:spPr>
-          <p:style>
-            <a:lnRef idx="2">
-              <a:schemeClr val="accent1">
-                <a:shade val="50000"/>
-              </a:schemeClr>
-            </a:lnRef>
-            <a:fillRef idx="1">
-              <a:schemeClr val="accent1"/>
-            </a:fillRef>
-            <a:effectRef idx="0">
-              <a:schemeClr val="accent1"/>
-            </a:effectRef>
-            <a:fontRef idx="minor">
-              <a:schemeClr val="lt1"/>
-            </a:fontRef>
-          </p:style>
-          <p:txBody>
-            <a:bodyPr rtlCol="0" anchor="ctr"/>
-            <a:lstStyle/>
-            <a:p>
-              <a:pPr algn="ctr"/>
-              <a:endParaRPr lang="ko-KR" altLang="en-US" sz="2700"/>
-            </a:p>
-          </p:txBody>
-        </p:sp>
-      </p:grpSp>
-      <p:sp>
-        <p:nvSpPr>
-          <p:cNvPr id="11" name="TextBox 10">
-            <a:extLst>
-              <a:ext uri="{FF2B5EF4-FFF2-40B4-BE49-F238E27FC236}">
-                <a16:creationId xmlns:a16="http://schemas.microsoft.com/office/drawing/2014/main" id="{E8AD0520-2116-4FC0-9CAE-F4CB8AE6732E}"/>
-              </a:ext>
-            </a:extLst>
-          </p:cNvPr>
-          <p:cNvSpPr txBox="1"/>
-          <p:nvPr/>
-        </p:nvSpPr>
-        <p:spPr>
-          <a:xfrm>
-            <a:off x="5832711" y="1536306"/>
-            <a:ext cx="4623159" cy="646331"/>
-          </a:xfrm>
-          <a:prstGeom prst="rect">
-            <a:avLst/>
-          </a:prstGeom>
-          <a:noFill/>
-        </p:spPr>
-        <p:txBody>
-          <a:bodyPr wrap="square" rtlCol="0">
-            <a:spAutoFit/>
-          </a:bodyPr>
-          <a:lstStyle/>
-          <a:p>
-            <a:r>
-              <a:rPr lang="fr-FR" altLang="ko-KR" b="1" dirty="0">
-                <a:solidFill>
-                  <a:schemeClr val="bg1"/>
-                </a:solidFill>
-                <a:cs typeface="Arial" pitchFamily="34" charset="0"/>
-              </a:rPr>
-              <a:t>Permet de donner une vision globale du comportement  d’un système </a:t>
-            </a:r>
-            <a:endParaRPr lang="ko-KR" altLang="en-US" b="1" dirty="0">
-              <a:solidFill>
-                <a:schemeClr val="bg1"/>
-              </a:solidFill>
-              <a:cs typeface="Arial" pitchFamily="34" charset="0"/>
-            </a:endParaRPr>
-          </a:p>
-        </p:txBody>
-      </p:sp>
-      <p:grpSp>
-        <p:nvGrpSpPr>
-          <p:cNvPr id="15" name="Group 14">
-            <a:extLst>
-              <a:ext uri="{FF2B5EF4-FFF2-40B4-BE49-F238E27FC236}">
-                <a16:creationId xmlns:a16="http://schemas.microsoft.com/office/drawing/2014/main" id="{81326ED9-24E5-4182-8DE7-82180F02404B}"/>
-              </a:ext>
-            </a:extLst>
-          </p:cNvPr>
-          <p:cNvGrpSpPr/>
-          <p:nvPr/>
-        </p:nvGrpSpPr>
-        <p:grpSpPr>
-          <a:xfrm>
-            <a:off x="6406065" y="2437183"/>
-            <a:ext cx="4623159" cy="646331"/>
-            <a:chOff x="4965552" y="1736224"/>
-            <a:chExt cx="3484978" cy="646331"/>
-          </a:xfrm>
-        </p:grpSpPr>
-        <p:sp>
-          <p:nvSpPr>
-            <p:cNvPr id="16" name="TextBox 15">
-              <a:extLst>
-                <a:ext uri="{FF2B5EF4-FFF2-40B4-BE49-F238E27FC236}">
-                  <a16:creationId xmlns:a16="http://schemas.microsoft.com/office/drawing/2014/main" id="{F5A6116F-18EA-4E03-A8BD-40557322D8E3}"/>
-                </a:ext>
-              </a:extLst>
-            </p:cNvPr>
-            <p:cNvSpPr txBox="1"/>
-            <p:nvPr/>
-          </p:nvSpPr>
-          <p:spPr>
-            <a:xfrm>
-              <a:off x="4965552" y="2001302"/>
-              <a:ext cx="3484978" cy="276999"/>
-            </a:xfrm>
-            <a:prstGeom prst="rect">
-              <a:avLst/>
-            </a:prstGeom>
-            <a:noFill/>
-          </p:spPr>
-          <p:txBody>
-            <a:bodyPr wrap="square" rtlCol="0">
-              <a:spAutoFit/>
-            </a:bodyPr>
-            <a:lstStyle/>
-            <a:p>
-              <a:endParaRPr lang="ko-KR" altLang="en-US" sz="1200" dirty="0">
-                <a:solidFill>
-                  <a:schemeClr val="bg1"/>
-                </a:solidFill>
-                <a:cs typeface="Arial" pitchFamily="34" charset="0"/>
-              </a:endParaRPr>
-            </a:p>
-          </p:txBody>
-        </p:sp>
-        <p:sp>
-          <p:nvSpPr>
-            <p:cNvPr id="17" name="TextBox 16">
-              <a:extLst>
-                <a:ext uri="{FF2B5EF4-FFF2-40B4-BE49-F238E27FC236}">
-                  <a16:creationId xmlns:a16="http://schemas.microsoft.com/office/drawing/2014/main" id="{D3496B0B-8027-40FB-ABFA-11E30FAA11CA}"/>
-                </a:ext>
-              </a:extLst>
-            </p:cNvPr>
-            <p:cNvSpPr txBox="1"/>
-            <p:nvPr/>
-          </p:nvSpPr>
-          <p:spPr>
-            <a:xfrm>
-              <a:off x="4965552" y="1736224"/>
-              <a:ext cx="3484978" cy="646331"/>
-            </a:xfrm>
-            <a:prstGeom prst="rect">
-              <a:avLst/>
-            </a:prstGeom>
-            <a:noFill/>
-          </p:spPr>
-          <p:txBody>
-            <a:bodyPr wrap="square" rtlCol="0">
-              <a:spAutoFit/>
-            </a:bodyPr>
-            <a:lstStyle/>
-            <a:p>
-              <a:r>
-                <a:rPr lang="en-US" altLang="ko-KR" b="1" dirty="0">
-                  <a:solidFill>
-                    <a:schemeClr val="bg1"/>
-                  </a:solidFill>
-                  <a:cs typeface="Arial" pitchFamily="34" charset="0"/>
-                </a:rPr>
-                <a:t>Les </a:t>
-              </a:r>
-              <a:r>
-                <a:rPr lang="en-US" altLang="ko-KR" b="1" dirty="0" err="1">
-                  <a:solidFill>
-                    <a:schemeClr val="bg1"/>
-                  </a:solidFill>
-                  <a:cs typeface="Arial" pitchFamily="34" charset="0"/>
-                </a:rPr>
-                <a:t>utilisateurs</a:t>
-              </a:r>
-              <a:r>
-                <a:rPr lang="en-US" altLang="ko-KR" b="1" dirty="0">
-                  <a:solidFill>
-                    <a:schemeClr val="bg1"/>
-                  </a:solidFill>
-                  <a:cs typeface="Arial" pitchFamily="34" charset="0"/>
-                </a:rPr>
-                <a:t> </a:t>
-              </a:r>
-              <a:r>
-                <a:rPr lang="en-US" altLang="ko-KR" b="1" dirty="0" err="1">
-                  <a:solidFill>
-                    <a:schemeClr val="bg1"/>
-                  </a:solidFill>
-                  <a:cs typeface="Arial" pitchFamily="34" charset="0"/>
-                </a:rPr>
-                <a:t>ou</a:t>
-              </a:r>
-              <a:r>
-                <a:rPr lang="en-US" altLang="ko-KR" b="1" dirty="0">
-                  <a:solidFill>
-                    <a:schemeClr val="bg1"/>
-                  </a:solidFill>
-                  <a:cs typeface="Arial" pitchFamily="34" charset="0"/>
-                </a:rPr>
-                <a:t> “</a:t>
-              </a:r>
-              <a:r>
-                <a:rPr lang="en-US" altLang="ko-KR" b="1" dirty="0" err="1">
-                  <a:solidFill>
-                    <a:schemeClr val="bg1"/>
-                  </a:solidFill>
-                  <a:cs typeface="Arial" pitchFamily="34" charset="0"/>
-                </a:rPr>
-                <a:t>Acteurs</a:t>
-              </a:r>
-              <a:r>
-                <a:rPr lang="en-US" altLang="ko-KR" b="1" dirty="0">
-                  <a:solidFill>
-                    <a:schemeClr val="bg1"/>
-                  </a:solidFill>
-                  <a:cs typeface="Arial" pitchFamily="34" charset="0"/>
-                </a:rPr>
-                <a:t>” </a:t>
-              </a:r>
-              <a:r>
-                <a:rPr lang="en-US" altLang="ko-KR" b="1" dirty="0" err="1">
-                  <a:solidFill>
-                    <a:schemeClr val="bg1"/>
-                  </a:solidFill>
-                  <a:cs typeface="Arial" pitchFamily="34" charset="0"/>
-                </a:rPr>
-                <a:t>interagissent</a:t>
-              </a:r>
-              <a:r>
-                <a:rPr lang="en-US" altLang="ko-KR" b="1" dirty="0">
-                  <a:solidFill>
-                    <a:schemeClr val="bg1"/>
-                  </a:solidFill>
-                  <a:cs typeface="Arial" pitchFamily="34" charset="0"/>
-                </a:rPr>
-                <a:t> avec les </a:t>
-              </a:r>
-              <a:r>
-                <a:rPr lang="en-US" altLang="ko-KR" b="1" dirty="0" err="1">
-                  <a:solidFill>
-                    <a:schemeClr val="bg1"/>
-                  </a:solidFill>
-                  <a:cs typeface="Arial" pitchFamily="34" charset="0"/>
-                </a:rPr>
-                <a:t>cas</a:t>
-              </a:r>
-              <a:r>
-                <a:rPr lang="en-US" altLang="ko-KR" b="1" dirty="0">
-                  <a:solidFill>
-                    <a:schemeClr val="bg1"/>
-                  </a:solidFill>
-                  <a:cs typeface="Arial" pitchFamily="34" charset="0"/>
-                </a:rPr>
-                <a:t> </a:t>
-              </a:r>
-              <a:r>
-                <a:rPr lang="en-US" altLang="ko-KR" b="1" dirty="0" err="1">
-                  <a:solidFill>
-                    <a:schemeClr val="bg1"/>
-                  </a:solidFill>
-                  <a:cs typeface="Arial" pitchFamily="34" charset="0"/>
-                </a:rPr>
-                <a:t>d’utilisations</a:t>
-              </a:r>
-              <a:r>
-                <a:rPr lang="en-US" altLang="ko-KR" b="1" dirty="0">
-                  <a:solidFill>
-                    <a:schemeClr val="bg1"/>
-                  </a:solidFill>
-                  <a:cs typeface="Arial" pitchFamily="34" charset="0"/>
-                </a:rPr>
-                <a:t> </a:t>
-              </a:r>
-              <a:endParaRPr lang="ko-KR" altLang="en-US" b="1" dirty="0">
-                <a:solidFill>
-                  <a:schemeClr val="bg1"/>
-                </a:solidFill>
-                <a:cs typeface="Arial" pitchFamily="34" charset="0"/>
-              </a:endParaRPr>
-            </a:p>
-          </p:txBody>
-        </p:sp>
-      </p:grpSp>
-      <p:grpSp>
-        <p:nvGrpSpPr>
-          <p:cNvPr id="27" name="그룹 3">
-            <a:extLst>
-              <a:ext uri="{FF2B5EF4-FFF2-40B4-BE49-F238E27FC236}">
-                <a16:creationId xmlns:a16="http://schemas.microsoft.com/office/drawing/2014/main" id="{B26F5175-49BB-43FA-BB34-AAE326C3F67C}"/>
-              </a:ext>
-            </a:extLst>
-          </p:cNvPr>
-          <p:cNvGrpSpPr/>
-          <p:nvPr/>
-        </p:nvGrpSpPr>
-        <p:grpSpPr>
-          <a:xfrm>
-            <a:off x="1242221" y="1792441"/>
-            <a:ext cx="4250497" cy="4250497"/>
-            <a:chOff x="735328" y="1762623"/>
-            <a:chExt cx="4250497" cy="4250497"/>
-          </a:xfrm>
-        </p:grpSpPr>
-        <p:sp>
-          <p:nvSpPr>
-            <p:cNvPr id="28" name="Block Arc 27">
-              <a:extLst>
-                <a:ext uri="{FF2B5EF4-FFF2-40B4-BE49-F238E27FC236}">
-                  <a16:creationId xmlns:a16="http://schemas.microsoft.com/office/drawing/2014/main" id="{10D51085-B919-482D-AC2A-D1CFCA61FC33}"/>
-                </a:ext>
-              </a:extLst>
-            </p:cNvPr>
-            <p:cNvSpPr/>
-            <p:nvPr/>
-          </p:nvSpPr>
-          <p:spPr>
-            <a:xfrm>
-              <a:off x="735328" y="1762623"/>
-              <a:ext cx="4250497" cy="4250497"/>
-            </a:xfrm>
-            <a:prstGeom prst="blockArc">
-              <a:avLst>
-                <a:gd name="adj1" fmla="val 4228396"/>
-                <a:gd name="adj2" fmla="val 7060926"/>
-                <a:gd name="adj3" fmla="val 5247"/>
-              </a:avLst>
-            </a:prstGeom>
-            <a:solidFill>
-              <a:schemeClr val="accent4"/>
-            </a:solidFill>
-            <a:ln>
-              <a:noFill/>
-            </a:ln>
-          </p:spPr>
-          <p:style>
-            <a:lnRef idx="2">
-              <a:schemeClr val="accent1">
-                <a:shade val="50000"/>
-              </a:schemeClr>
-            </a:lnRef>
-            <a:fillRef idx="1">
-              <a:schemeClr val="accent1"/>
-            </a:fillRef>
-            <a:effectRef idx="0">
-              <a:schemeClr val="accent1"/>
-            </a:effectRef>
-            <a:fontRef idx="minor">
-              <a:schemeClr val="lt1"/>
-            </a:fontRef>
-          </p:style>
-          <p:txBody>
-            <a:bodyPr rtlCol="0" anchor="ctr"/>
-            <a:lstStyle/>
-            <a:p>
-              <a:pPr algn="ctr"/>
-              <a:endParaRPr lang="ko-KR" altLang="en-US" sz="2700">
-                <a:solidFill>
-                  <a:schemeClr val="tx1"/>
-                </a:solidFill>
-              </a:endParaRPr>
-            </a:p>
-          </p:txBody>
-        </p:sp>
-        <p:sp>
-          <p:nvSpPr>
-            <p:cNvPr id="29" name="Block Arc 28">
-              <a:extLst>
-                <a:ext uri="{FF2B5EF4-FFF2-40B4-BE49-F238E27FC236}">
-                  <a16:creationId xmlns:a16="http://schemas.microsoft.com/office/drawing/2014/main" id="{99B3B08C-2DAD-4A2C-9614-3D5D7DE0C8FC}"/>
-                </a:ext>
-              </a:extLst>
-            </p:cNvPr>
-            <p:cNvSpPr/>
-            <p:nvPr/>
-          </p:nvSpPr>
-          <p:spPr>
-            <a:xfrm>
-              <a:off x="735328" y="1762623"/>
-              <a:ext cx="4250497" cy="4250497"/>
-            </a:xfrm>
-            <a:prstGeom prst="blockArc">
-              <a:avLst>
-                <a:gd name="adj1" fmla="val 1492588"/>
-                <a:gd name="adj2" fmla="val 4237585"/>
-                <a:gd name="adj3" fmla="val 5220"/>
-              </a:avLst>
-            </a:prstGeom>
-            <a:solidFill>
-              <a:schemeClr val="accent3"/>
-            </a:solidFill>
-            <a:ln>
-              <a:noFill/>
-            </a:ln>
-          </p:spPr>
-          <p:style>
-            <a:lnRef idx="2">
-              <a:schemeClr val="accent1">
-                <a:shade val="50000"/>
-              </a:schemeClr>
-            </a:lnRef>
-            <a:fillRef idx="1">
-              <a:schemeClr val="accent1"/>
-            </a:fillRef>
-            <a:effectRef idx="0">
-              <a:schemeClr val="accent1"/>
-            </a:effectRef>
-            <a:fontRef idx="minor">
-              <a:schemeClr val="lt1"/>
-            </a:fontRef>
-          </p:style>
-          <p:txBody>
-            <a:bodyPr rtlCol="0" anchor="ctr"/>
-            <a:lstStyle/>
-            <a:p>
-              <a:pPr algn="ctr"/>
-              <a:endParaRPr lang="ko-KR" altLang="en-US" sz="2700">
-                <a:solidFill>
-                  <a:schemeClr val="tx1"/>
-                </a:solidFill>
-              </a:endParaRPr>
-            </a:p>
-          </p:txBody>
-        </p:sp>
-        <p:sp>
-          <p:nvSpPr>
-            <p:cNvPr id="30" name="Block Arc 29">
-              <a:extLst>
-                <a:ext uri="{FF2B5EF4-FFF2-40B4-BE49-F238E27FC236}">
-                  <a16:creationId xmlns:a16="http://schemas.microsoft.com/office/drawing/2014/main" id="{A6A6D8C2-0D8B-4B84-9B64-E00D2B52404A}"/>
-                </a:ext>
-              </a:extLst>
-            </p:cNvPr>
-            <p:cNvSpPr/>
-            <p:nvPr/>
-          </p:nvSpPr>
-          <p:spPr>
-            <a:xfrm>
-              <a:off x="735328" y="1762623"/>
-              <a:ext cx="4250497" cy="4250497"/>
-            </a:xfrm>
-            <a:prstGeom prst="blockArc">
-              <a:avLst>
-                <a:gd name="adj1" fmla="val 20334074"/>
-                <a:gd name="adj2" fmla="val 1503961"/>
-                <a:gd name="adj3" fmla="val 5284"/>
-              </a:avLst>
-            </a:prstGeom>
-            <a:solidFill>
-              <a:schemeClr val="accent2"/>
-            </a:solidFill>
-            <a:ln>
-              <a:noFill/>
-            </a:ln>
-          </p:spPr>
-          <p:style>
-            <a:lnRef idx="2">
-              <a:schemeClr val="accent1">
-                <a:shade val="50000"/>
-              </a:schemeClr>
-            </a:lnRef>
-            <a:fillRef idx="1">
-              <a:schemeClr val="accent1"/>
-            </a:fillRef>
-            <a:effectRef idx="0">
-              <a:schemeClr val="accent1"/>
-            </a:effectRef>
-            <a:fontRef idx="minor">
-              <a:schemeClr val="lt1"/>
-            </a:fontRef>
-          </p:style>
-          <p:txBody>
-            <a:bodyPr rtlCol="0" anchor="ctr"/>
-            <a:lstStyle/>
-            <a:p>
-              <a:pPr algn="ctr"/>
-              <a:endParaRPr lang="ko-KR" altLang="en-US" sz="2700">
-                <a:solidFill>
-                  <a:schemeClr val="tx1"/>
-                </a:solidFill>
-              </a:endParaRPr>
-            </a:p>
-          </p:txBody>
-        </p:sp>
-        <p:sp>
-          <p:nvSpPr>
-            <p:cNvPr id="31" name="Block Arc 30">
-              <a:extLst>
-                <a:ext uri="{FF2B5EF4-FFF2-40B4-BE49-F238E27FC236}">
-                  <a16:creationId xmlns:a16="http://schemas.microsoft.com/office/drawing/2014/main" id="{560DAC13-F053-46DC-B6AE-46FAA1FC2690}"/>
-                </a:ext>
-              </a:extLst>
-            </p:cNvPr>
-            <p:cNvSpPr/>
-            <p:nvPr/>
-          </p:nvSpPr>
-          <p:spPr>
-            <a:xfrm>
-              <a:off x="735328" y="1762623"/>
-              <a:ext cx="4250497" cy="4250497"/>
-            </a:xfrm>
-            <a:prstGeom prst="blockArc">
-              <a:avLst>
-                <a:gd name="adj1" fmla="val 17549958"/>
-                <a:gd name="adj2" fmla="val 20340767"/>
-                <a:gd name="adj3" fmla="val 5288"/>
-              </a:avLst>
-            </a:prstGeom>
-            <a:solidFill>
-              <a:schemeClr val="accent1"/>
-            </a:solidFill>
-            <a:ln>
-              <a:noFill/>
-            </a:ln>
-          </p:spPr>
-          <p:style>
-            <a:lnRef idx="2">
-              <a:schemeClr val="accent1">
-                <a:shade val="50000"/>
-              </a:schemeClr>
-            </a:lnRef>
-            <a:fillRef idx="1">
-              <a:schemeClr val="accent1"/>
-            </a:fillRef>
-            <a:effectRef idx="0">
-              <a:schemeClr val="accent1"/>
-            </a:effectRef>
-            <a:fontRef idx="minor">
-              <a:schemeClr val="lt1"/>
-            </a:fontRef>
-          </p:style>
-          <p:txBody>
-            <a:bodyPr rtlCol="0" anchor="ctr"/>
-            <a:lstStyle/>
-            <a:p>
-              <a:pPr algn="ctr"/>
-              <a:endParaRPr lang="ko-KR" altLang="en-US" sz="2700">
-                <a:solidFill>
-                  <a:schemeClr val="tx1"/>
-                </a:solidFill>
-              </a:endParaRPr>
-            </a:p>
-          </p:txBody>
-        </p:sp>
-        <p:sp>
-          <p:nvSpPr>
-            <p:cNvPr id="32" name="Block Arc 5">
-              <a:extLst>
-                <a:ext uri="{FF2B5EF4-FFF2-40B4-BE49-F238E27FC236}">
-                  <a16:creationId xmlns:a16="http://schemas.microsoft.com/office/drawing/2014/main" id="{6BF9E105-1EAB-4173-888C-1F0EEBD62591}"/>
-                </a:ext>
-              </a:extLst>
-            </p:cNvPr>
-            <p:cNvSpPr/>
-            <p:nvPr/>
-          </p:nvSpPr>
-          <p:spPr>
-            <a:xfrm>
-              <a:off x="735328" y="1762623"/>
-              <a:ext cx="4250497" cy="4250497"/>
-            </a:xfrm>
-            <a:prstGeom prst="blockArc">
-              <a:avLst>
-                <a:gd name="adj1" fmla="val 14520241"/>
-                <a:gd name="adj2" fmla="val 17553267"/>
-                <a:gd name="adj3" fmla="val 5243"/>
-              </a:avLst>
-            </a:prstGeom>
-            <a:solidFill>
-              <a:schemeClr val="accent6"/>
-            </a:solidFill>
-            <a:ln>
-              <a:noFill/>
-            </a:ln>
-          </p:spPr>
-          <p:style>
-            <a:lnRef idx="2">
-              <a:schemeClr val="accent1">
-                <a:shade val="50000"/>
-              </a:schemeClr>
-            </a:lnRef>
-            <a:fillRef idx="1">
-              <a:schemeClr val="accent1"/>
-            </a:fillRef>
-            <a:effectRef idx="0">
-              <a:schemeClr val="accent1"/>
-            </a:effectRef>
-            <a:fontRef idx="minor">
-              <a:schemeClr val="lt1"/>
-            </a:fontRef>
-          </p:style>
-          <p:txBody>
-            <a:bodyPr rtlCol="0" anchor="ctr"/>
-            <a:lstStyle/>
-            <a:p>
-              <a:pPr algn="ctr"/>
-              <a:endParaRPr lang="ko-KR" altLang="en-US" sz="2700" dirty="0">
-                <a:solidFill>
-                  <a:schemeClr val="tx1"/>
-                </a:solidFill>
-              </a:endParaRPr>
-            </a:p>
-          </p:txBody>
-        </p:sp>
-      </p:grpSp>
-      <p:sp>
-        <p:nvSpPr>
-          <p:cNvPr id="33" name="Text Placeholder 32">
-            <a:extLst>
-              <a:ext uri="{FF2B5EF4-FFF2-40B4-BE49-F238E27FC236}">
-                <a16:creationId xmlns:a16="http://schemas.microsoft.com/office/drawing/2014/main" id="{500B7DC1-4390-40EC-B83A-416B373086C2}"/>
-              </a:ext>
-            </a:extLst>
-          </p:cNvPr>
-          <p:cNvSpPr>
-            <a:spLocks noGrp="1"/>
-          </p:cNvSpPr>
-          <p:nvPr>
-            <p:ph type="body" sz="quarter" idx="10"/>
-          </p:nvPr>
-        </p:nvSpPr>
-        <p:spPr/>
-        <p:txBody>
-          <a:bodyPr/>
-          <a:lstStyle/>
-          <a:p>
-            <a:r>
-              <a:rPr lang="en-US" dirty="0" err="1"/>
-              <a:t>Diagramme</a:t>
-            </a:r>
-            <a:r>
-              <a:rPr lang="en-US" dirty="0"/>
-              <a:t> </a:t>
-            </a:r>
-            <a:r>
-              <a:rPr lang="en-US" dirty="0" err="1"/>
-              <a:t>d’utilisations</a:t>
-            </a:r>
-            <a:endParaRPr lang="en-US" dirty="0"/>
-          </a:p>
-        </p:txBody>
-      </p:sp>
-      <p:grpSp>
-        <p:nvGrpSpPr>
-          <p:cNvPr id="34" name="Group 14">
-            <a:extLst>
-              <a:ext uri="{FF2B5EF4-FFF2-40B4-BE49-F238E27FC236}">
-                <a16:creationId xmlns:a16="http://schemas.microsoft.com/office/drawing/2014/main" id="{36622002-0BCC-4B4C-9431-E5E5CA92FE59}"/>
-              </a:ext>
-            </a:extLst>
-          </p:cNvPr>
-          <p:cNvGrpSpPr/>
-          <p:nvPr/>
-        </p:nvGrpSpPr>
-        <p:grpSpPr>
-          <a:xfrm>
-            <a:off x="6549932" y="3718400"/>
-            <a:ext cx="4623159" cy="923330"/>
-            <a:chOff x="4965552" y="1736224"/>
-            <a:chExt cx="3484978" cy="923330"/>
-          </a:xfrm>
-        </p:grpSpPr>
-        <p:sp>
-          <p:nvSpPr>
-            <p:cNvPr id="36" name="TextBox 15">
-              <a:extLst>
-                <a:ext uri="{FF2B5EF4-FFF2-40B4-BE49-F238E27FC236}">
-                  <a16:creationId xmlns:a16="http://schemas.microsoft.com/office/drawing/2014/main" id="{F30F3462-060D-47E3-B8FA-64032DC3655B}"/>
-                </a:ext>
-              </a:extLst>
-            </p:cNvPr>
-            <p:cNvSpPr txBox="1"/>
-            <p:nvPr/>
-          </p:nvSpPr>
-          <p:spPr>
-            <a:xfrm>
-              <a:off x="4965552" y="2001302"/>
-              <a:ext cx="3484978" cy="276999"/>
-            </a:xfrm>
-            <a:prstGeom prst="rect">
-              <a:avLst/>
-            </a:prstGeom>
-            <a:noFill/>
-          </p:spPr>
-          <p:txBody>
-            <a:bodyPr wrap="square" rtlCol="0">
-              <a:spAutoFit/>
-            </a:bodyPr>
-            <a:lstStyle/>
-            <a:p>
-              <a:endParaRPr lang="ko-KR" altLang="en-US" sz="1200" dirty="0">
-                <a:solidFill>
-                  <a:schemeClr val="bg1"/>
-                </a:solidFill>
-                <a:cs typeface="Arial" pitchFamily="34" charset="0"/>
-              </a:endParaRPr>
-            </a:p>
-          </p:txBody>
-        </p:sp>
-        <p:sp>
-          <p:nvSpPr>
-            <p:cNvPr id="37" name="TextBox 16">
-              <a:extLst>
-                <a:ext uri="{FF2B5EF4-FFF2-40B4-BE49-F238E27FC236}">
-                  <a16:creationId xmlns:a16="http://schemas.microsoft.com/office/drawing/2014/main" id="{83515874-34DD-42F0-9371-F8FDA8BFF019}"/>
-                </a:ext>
-              </a:extLst>
-            </p:cNvPr>
-            <p:cNvSpPr txBox="1"/>
-            <p:nvPr/>
-          </p:nvSpPr>
-          <p:spPr>
-            <a:xfrm>
-              <a:off x="4965552" y="1736224"/>
-              <a:ext cx="3484978" cy="923330"/>
-            </a:xfrm>
-            <a:prstGeom prst="rect">
-              <a:avLst/>
-            </a:prstGeom>
-            <a:noFill/>
-          </p:spPr>
-          <p:txBody>
-            <a:bodyPr wrap="square" rtlCol="0">
-              <a:spAutoFit/>
-            </a:bodyPr>
-            <a:lstStyle/>
-            <a:p>
-              <a:r>
-                <a:rPr lang="en-US" altLang="ko-KR" b="1" dirty="0">
-                  <a:solidFill>
-                    <a:schemeClr val="bg1"/>
-                  </a:solidFill>
-                  <a:cs typeface="Arial" pitchFamily="34" charset="0"/>
-                </a:rPr>
-                <a:t>Me </a:t>
-              </a:r>
-              <a:r>
-                <a:rPr lang="en-US" altLang="ko-KR" b="1" dirty="0" err="1">
-                  <a:solidFill>
-                    <a:schemeClr val="bg1"/>
-                  </a:solidFill>
-                  <a:cs typeface="Arial" pitchFamily="34" charset="0"/>
-                </a:rPr>
-                <a:t>permet</a:t>
-              </a:r>
-              <a:r>
-                <a:rPr lang="en-US" altLang="ko-KR" b="1" dirty="0">
-                  <a:solidFill>
-                    <a:schemeClr val="bg1"/>
-                  </a:solidFill>
-                  <a:cs typeface="Arial" pitchFamily="34" charset="0"/>
-                </a:rPr>
-                <a:t> de lister les </a:t>
-              </a:r>
-              <a:r>
-                <a:rPr lang="en-US" altLang="ko-KR" b="1" dirty="0" err="1">
-                  <a:solidFill>
-                    <a:schemeClr val="bg1"/>
-                  </a:solidFill>
-                  <a:cs typeface="Arial" pitchFamily="34" charset="0"/>
-                </a:rPr>
-                <a:t>acteurs</a:t>
-              </a:r>
-              <a:r>
-                <a:rPr lang="en-US" altLang="ko-KR" b="1" dirty="0">
-                  <a:solidFill>
-                    <a:schemeClr val="bg1"/>
-                  </a:solidFill>
-                  <a:cs typeface="Arial" pitchFamily="34" charset="0"/>
-                </a:rPr>
-                <a:t> et les </a:t>
-              </a:r>
-              <a:r>
-                <a:rPr lang="en-US" altLang="ko-KR" b="1" dirty="0" err="1">
-                  <a:solidFill>
-                    <a:schemeClr val="bg1"/>
-                  </a:solidFill>
-                  <a:cs typeface="Arial" pitchFamily="34" charset="0"/>
-                </a:rPr>
-                <a:t>potentiels</a:t>
-              </a:r>
-              <a:r>
-                <a:rPr lang="en-US" altLang="ko-KR" b="1" dirty="0">
-                  <a:solidFill>
-                    <a:schemeClr val="bg1"/>
-                  </a:solidFill>
-                  <a:cs typeface="Arial" pitchFamily="34" charset="0"/>
-                </a:rPr>
-                <a:t> </a:t>
-              </a:r>
-              <a:r>
-                <a:rPr lang="en-US" altLang="ko-KR" b="1" dirty="0" err="1">
-                  <a:solidFill>
-                    <a:schemeClr val="bg1"/>
-                  </a:solidFill>
-                  <a:cs typeface="Arial" pitchFamily="34" charset="0"/>
-                </a:rPr>
-                <a:t>statuts</a:t>
-              </a:r>
-              <a:r>
-                <a:rPr lang="en-US" altLang="ko-KR" b="1" dirty="0">
-                  <a:solidFill>
-                    <a:schemeClr val="bg1"/>
-                  </a:solidFill>
-                  <a:cs typeface="Arial" pitchFamily="34" charset="0"/>
-                </a:rPr>
-                <a:t> </a:t>
-              </a:r>
-              <a:r>
-                <a:rPr lang="en-US" altLang="ko-KR" b="1" dirty="0" err="1">
-                  <a:solidFill>
-                    <a:schemeClr val="bg1"/>
-                  </a:solidFill>
-                  <a:cs typeface="Arial" pitchFamily="34" charset="0"/>
-                </a:rPr>
-                <a:t>qu’il</a:t>
-              </a:r>
-              <a:r>
-                <a:rPr lang="en-US" altLang="ko-KR" b="1" dirty="0">
-                  <a:solidFill>
-                    <a:schemeClr val="bg1"/>
-                  </a:solidFill>
-                  <a:cs typeface="Arial" pitchFamily="34" charset="0"/>
-                </a:rPr>
-                <a:t> </a:t>
-              </a:r>
-              <a:r>
-                <a:rPr lang="en-US" altLang="ko-KR" b="1" dirty="0" err="1">
-                  <a:solidFill>
-                    <a:schemeClr val="bg1"/>
-                  </a:solidFill>
-                  <a:cs typeface="Arial" pitchFamily="34" charset="0"/>
-                </a:rPr>
-                <a:t>pourrait</a:t>
-              </a:r>
-              <a:r>
-                <a:rPr lang="en-US" altLang="ko-KR" b="1" dirty="0">
-                  <a:solidFill>
-                    <a:schemeClr val="bg1"/>
-                  </a:solidFill>
-                  <a:cs typeface="Arial" pitchFamily="34" charset="0"/>
-                </a:rPr>
-                <a:t> y </a:t>
-              </a:r>
-              <a:r>
-                <a:rPr lang="en-US" altLang="ko-KR" b="1" dirty="0" err="1">
-                  <a:solidFill>
-                    <a:schemeClr val="bg1"/>
-                  </a:solidFill>
-                  <a:cs typeface="Arial" pitchFamily="34" charset="0"/>
-                </a:rPr>
-                <a:t>avoir</a:t>
-              </a:r>
-              <a:r>
-                <a:rPr lang="en-US" altLang="ko-KR" b="1" dirty="0">
-                  <a:solidFill>
-                    <a:schemeClr val="bg1"/>
-                  </a:solidFill>
-                  <a:cs typeface="Arial" pitchFamily="34" charset="0"/>
-                </a:rPr>
-                <a:t> pour </a:t>
-              </a:r>
-              <a:r>
-                <a:rPr lang="en-US" altLang="ko-KR" b="1" dirty="0" err="1">
-                  <a:solidFill>
-                    <a:schemeClr val="bg1"/>
-                  </a:solidFill>
-                  <a:cs typeface="Arial" pitchFamily="34" charset="0"/>
-                </a:rPr>
-                <a:t>ces</a:t>
-              </a:r>
-              <a:r>
-                <a:rPr lang="en-US" altLang="ko-KR" b="1" dirty="0">
-                  <a:solidFill>
-                    <a:schemeClr val="bg1"/>
-                  </a:solidFill>
-                  <a:cs typeface="Arial" pitchFamily="34" charset="0"/>
-                </a:rPr>
-                <a:t> </a:t>
-              </a:r>
-              <a:r>
-                <a:rPr lang="en-US" altLang="ko-KR" b="1" dirty="0" err="1">
-                  <a:solidFill>
-                    <a:schemeClr val="bg1"/>
-                  </a:solidFill>
-                  <a:cs typeface="Arial" pitchFamily="34" charset="0"/>
-                </a:rPr>
-                <a:t>acteurs</a:t>
-              </a:r>
-              <a:endParaRPr lang="ko-KR" altLang="en-US" b="1" dirty="0">
-                <a:solidFill>
-                  <a:schemeClr val="bg1"/>
-                </a:solidFill>
-                <a:cs typeface="Arial" pitchFamily="34" charset="0"/>
-              </a:endParaRPr>
-            </a:p>
-          </p:txBody>
-        </p:sp>
-      </p:grpSp>
-      <p:sp>
-        <p:nvSpPr>
-          <p:cNvPr id="38" name="TextBox 16">
-            <a:extLst>
-              <a:ext uri="{FF2B5EF4-FFF2-40B4-BE49-F238E27FC236}">
-                <a16:creationId xmlns:a16="http://schemas.microsoft.com/office/drawing/2014/main" id="{814700DF-B518-42BB-9D56-97CA1C0BC865}"/>
-              </a:ext>
-            </a:extLst>
-          </p:cNvPr>
-          <p:cNvSpPr txBox="1"/>
-          <p:nvPr/>
-        </p:nvSpPr>
-        <p:spPr>
-          <a:xfrm>
-            <a:off x="6243182" y="4907284"/>
-            <a:ext cx="4623159" cy="369332"/>
-          </a:xfrm>
-          <a:prstGeom prst="rect">
-            <a:avLst/>
-          </a:prstGeom>
-          <a:noFill/>
-        </p:spPr>
-        <p:txBody>
-          <a:bodyPr wrap="square" rtlCol="0">
-            <a:spAutoFit/>
-          </a:bodyPr>
-          <a:lstStyle/>
-          <a:p>
-            <a:r>
-              <a:rPr lang="en-US" altLang="ko-KR" b="1" dirty="0">
-                <a:solidFill>
-                  <a:schemeClr val="bg1"/>
-                </a:solidFill>
-                <a:cs typeface="Arial" pitchFamily="34" charset="0"/>
-              </a:rPr>
-              <a:t>Me </a:t>
-            </a:r>
-            <a:r>
-              <a:rPr lang="en-US" altLang="ko-KR" b="1" dirty="0" err="1">
-                <a:solidFill>
-                  <a:schemeClr val="bg1"/>
-                </a:solidFill>
-                <a:cs typeface="Arial" pitchFamily="34" charset="0"/>
-              </a:rPr>
-              <a:t>permet</a:t>
-            </a:r>
-            <a:r>
-              <a:rPr lang="en-US" altLang="ko-KR" b="1" dirty="0">
-                <a:solidFill>
-                  <a:schemeClr val="bg1"/>
-                </a:solidFill>
-                <a:cs typeface="Arial" pitchFamily="34" charset="0"/>
-              </a:rPr>
-              <a:t> de lister les actions</a:t>
-            </a:r>
-            <a:endParaRPr lang="ko-KR" altLang="en-US" b="1" dirty="0">
-              <a:solidFill>
-                <a:schemeClr val="bg1"/>
-              </a:solidFill>
-              <a:cs typeface="Arial" pitchFamily="34" charset="0"/>
-            </a:endParaRPr>
-          </a:p>
-        </p:txBody>
-      </p:sp>
-    </p:spTree>
-    <p:extLst>
-      <p:ext uri="{BB962C8B-B14F-4D97-AF65-F5344CB8AC3E}">
-        <p14:creationId xmlns:p14="http://schemas.microsoft.com/office/powerpoint/2010/main" val="2321231529"/>
-      </p:ext>
-    </p:extLst>
-  </p:cSld>
-  <p:clrMapOvr>
-    <a:masterClrMapping/>
-  </p:clrMapOvr>
-</p:sld>
-</file>
-
 <file path=ppt/slides/slide9.xml><?xml version="1.0" encoding="utf-8"?>
 <p:sld xmlns:a="http://schemas.openxmlformats.org/drawingml/2006/main" xmlns:r="http://schemas.openxmlformats.org/officeDocument/2006/relationships" xmlns:p="http://schemas.openxmlformats.org/presentationml/2006/main">
   <p:cSld>

</xml_diff>